<commit_message>
updating to version 1.5
</commit_message>
<xml_diff>
--- a/d4k Workshop mbot.pptx
+++ b/d4k Workshop mbot.pptx
@@ -11,6 +11,7 @@
     <p:sldId id="260" r:id="rId5"/>
     <p:sldId id="262" r:id="rId6"/>
     <p:sldId id="261" r:id="rId7"/>
+    <p:sldId id="264" r:id="rId8"/>
   </p:sldIdLst>
   <p:sldSz cx="6858000" cy="9144000" type="screen4x3"/>
   <p:notesSz cx="6797675" cy="9926638"/>
@@ -111,7 +112,7 @@
   </p:defaultTextStyle>
   <p:extLst>
     <p:ext uri="{EFAFB233-063F-42B5-8137-9DF3F51BA10A}">
-      <p15:sldGuideLst xmlns="" xmlns:p15="http://schemas.microsoft.com/office/powerpoint/2012/main">
+      <p15:sldGuideLst xmlns:p15="http://schemas.microsoft.com/office/powerpoint/2012/main">
         <p15:guide id="1" orient="horz" pos="2880">
           <p15:clr>
             <a:srgbClr val="A4A3A4"/>
@@ -1033,7 +1034,7 @@
     </p:spTree>
     <p:extLst>
       <p:ext uri="{BB962C8B-B14F-4D97-AF65-F5344CB8AC3E}">
-        <p14:creationId xmlns="" xmlns:p14="http://schemas.microsoft.com/office/powerpoint/2010/main" val="2458745817"/>
+        <p14:creationId xmlns:p14="http://schemas.microsoft.com/office/powerpoint/2010/main" val="2458745817"/>
       </p:ext>
     </p:extLst>
   </p:cSld>
@@ -1180,7 +1181,7 @@
                 <a:tabLst/>
                 <a:defRPr/>
               </a:pPr>
-              <a:t>‹#›</a:t>
+              <a:t>‹Nr.›</a:t>
             </a:fld>
             <a:r>
               <a:rPr kumimoji="0" lang="de-DE" sz="1200" b="0" i="0" u="none" strike="noStrike" kern="1200" cap="none" spc="0" normalizeH="0" baseline="0" noProof="0" dirty="0" smtClean="0">
@@ -1387,7 +1388,7 @@
                 <a:tabLst/>
                 <a:defRPr/>
               </a:pPr>
-              <a:t>‹#›</a:t>
+              <a:t>‹Nr.›</a:t>
             </a:fld>
             <a:r>
               <a:rPr kumimoji="0" lang="de-DE" sz="1200" b="0" i="0" u="none" strike="noStrike" kern="1200" cap="none" spc="0" normalizeH="0" baseline="0" noProof="0" dirty="0" smtClean="0">
@@ -1697,7 +1698,7 @@
           <p:nvPr>
             <p:extLst>
               <p:ext uri="{D42A27DB-BD31-4B8C-83A1-F6EECF244321}">
-                <p14:modId xmlns="" xmlns:p14="http://schemas.microsoft.com/office/powerpoint/2010/main" val="682914404"/>
+                <p14:modId xmlns:p14="http://schemas.microsoft.com/office/powerpoint/2010/main" val="682914404"/>
               </p:ext>
             </p:extLst>
           </p:nvPr>
@@ -1708,9 +1709,59 @@
         </p:xfrm>
         <a:graphic>
           <a:graphicData uri="http://schemas.openxmlformats.org/presentationml/2006/ole">
-            <p:oleObj spid="_x0000_s1166" name="Image" r:id="rId3" imgW="3250794" imgH="2069841" progId="">
-              <p:embed/>
-            </p:oleObj>
+            <mc:AlternateContent xmlns:mc="http://schemas.openxmlformats.org/markup-compatibility/2006">
+              <mc:Choice xmlns:v="urn:schemas-microsoft-com:vml" Requires="v">
+                <p:oleObj spid="_x0000_s1189" name="Image" r:id="rId3" imgW="3250794" imgH="2069841" progId="">
+                  <p:embed/>
+                </p:oleObj>
+              </mc:Choice>
+              <mc:Fallback>
+                <p:oleObj name="Image" r:id="rId3" imgW="3250794" imgH="2069841" progId="">
+                  <p:embed/>
+                  <p:pic>
+                    <p:nvPicPr>
+                      <p:cNvPr id="0" name="Picture 142"/>
+                      <p:cNvPicPr>
+                        <a:picLocks noChangeAspect="1" noChangeArrowheads="1"/>
+                      </p:cNvPicPr>
+                      <p:nvPr/>
+                    </p:nvPicPr>
+                    <p:blipFill>
+                      <a:blip r:embed="rId4">
+                        <a:extLst>
+                          <a:ext uri="{28A0092B-C50C-407E-A947-70E740481C1C}">
+                            <a14:useLocalDpi xmlns:a14="http://schemas.microsoft.com/office/drawing/2010/main" val="0"/>
+                          </a:ext>
+                        </a:extLst>
+                      </a:blip>
+                      <a:srcRect/>
+                      <a:stretch>
+                        <a:fillRect/>
+                      </a:stretch>
+                    </p:blipFill>
+                    <p:spPr bwMode="auto">
+                      <a:xfrm>
+                        <a:off x="95920" y="4106853"/>
+                        <a:ext cx="617488" cy="393166"/>
+                      </a:xfrm>
+                      <a:prstGeom prst="rect">
+                        <a:avLst/>
+                      </a:prstGeom>
+                      <a:noFill/>
+                      <a:extLst>
+                        <a:ext uri="{909E8E84-426E-40DD-AFC4-6F175D3DCCD1}">
+                          <a14:hiddenFill xmlns:a14="http://schemas.microsoft.com/office/drawing/2010/main">
+                            <a:solidFill>
+                              <a:srgbClr val="FFFFFF"/>
+                            </a:solidFill>
+                          </a14:hiddenFill>
+                        </a:ext>
+                      </a:extLst>
+                    </p:spPr>
+                  </p:pic>
+                </p:oleObj>
+              </mc:Fallback>
+            </mc:AlternateContent>
           </a:graphicData>
         </a:graphic>
       </p:graphicFrame>
@@ -1774,7 +1825,7 @@
           <p:nvPr/>
         </p:nvPicPr>
         <p:blipFill>
-          <a:blip r:embed="rId4" cstate="print"/>
+          <a:blip r:embed="rId5" cstate="print"/>
           <a:srcRect/>
           <a:stretch>
             <a:fillRect/>
@@ -1851,7 +1902,7 @@
           <p:nvPr/>
         </p:nvPicPr>
         <p:blipFill>
-          <a:blip r:embed="rId5" cstate="print"/>
+          <a:blip r:embed="rId6" cstate="print"/>
           <a:srcRect/>
           <a:stretch>
             <a:fillRect/>
@@ -1941,7 +1992,7 @@
           <a:lstStyle/>
           <a:p>
             <a:r>
-              <a:rPr lang="de-DE" smtClean="0"/>
+              <a:rPr lang="de-DE" dirty="0" smtClean="0"/>
               <a:t>Was ist was hier?</a:t>
             </a:r>
             <a:endParaRPr lang="de-DE" dirty="0"/>
@@ -1980,7 +2031,7 @@
           <p:nvPr>
             <p:extLst>
               <p:ext uri="{D42A27DB-BD31-4B8C-83A1-F6EECF244321}">
-                <p14:modId xmlns="" xmlns:p14="http://schemas.microsoft.com/office/powerpoint/2010/main" val="682914404"/>
+                <p14:modId xmlns:p14="http://schemas.microsoft.com/office/powerpoint/2010/main" val="682914404"/>
               </p:ext>
             </p:extLst>
           </p:nvPr>
@@ -1991,9 +2042,59 @@
         </p:xfrm>
         <a:graphic>
           <a:graphicData uri="http://schemas.openxmlformats.org/presentationml/2006/ole">
-            <p:oleObj spid="_x0000_s9218" name="Image" r:id="rId3" imgW="3250794" imgH="2069841" progId="">
-              <p:embed/>
-            </p:oleObj>
+            <mc:AlternateContent xmlns:mc="http://schemas.openxmlformats.org/markup-compatibility/2006">
+              <mc:Choice xmlns:v="urn:schemas-microsoft-com:vml" Requires="v">
+                <p:oleObj spid="_x0000_s9264" name="Image" r:id="rId3" imgW="3250794" imgH="2069841" progId="">
+                  <p:embed/>
+                </p:oleObj>
+              </mc:Choice>
+              <mc:Fallback>
+                <p:oleObj name="Image" r:id="rId3" imgW="3250794" imgH="2069841" progId="">
+                  <p:embed/>
+                  <p:pic>
+                    <p:nvPicPr>
+                      <p:cNvPr id="0" name="Object 142"/>
+                      <p:cNvPicPr>
+                        <a:picLocks noChangeAspect="1" noChangeArrowheads="1"/>
+                      </p:cNvPicPr>
+                      <p:nvPr/>
+                    </p:nvPicPr>
+                    <p:blipFill>
+                      <a:blip r:embed="rId4">
+                        <a:extLst>
+                          <a:ext uri="{28A0092B-C50C-407E-A947-70E740481C1C}">
+                            <a14:useLocalDpi xmlns:a14="http://schemas.microsoft.com/office/drawing/2010/main" val="0"/>
+                          </a:ext>
+                        </a:extLst>
+                      </a:blip>
+                      <a:srcRect/>
+                      <a:stretch>
+                        <a:fillRect/>
+                      </a:stretch>
+                    </p:blipFill>
+                    <p:spPr bwMode="auto">
+                      <a:xfrm>
+                        <a:off x="95920" y="4106853"/>
+                        <a:ext cx="617488" cy="393166"/>
+                      </a:xfrm>
+                      <a:prstGeom prst="rect">
+                        <a:avLst/>
+                      </a:prstGeom>
+                      <a:noFill/>
+                      <a:extLst>
+                        <a:ext uri="{909E8E84-426E-40DD-AFC4-6F175D3DCCD1}">
+                          <a14:hiddenFill xmlns:a14="http://schemas.microsoft.com/office/drawing/2010/main">
+                            <a:solidFill>
+                              <a:srgbClr val="FFFFFF"/>
+                            </a:solidFill>
+                          </a14:hiddenFill>
+                        </a:ext>
+                      </a:extLst>
+                    </p:spPr>
+                  </p:pic>
+                </p:oleObj>
+              </mc:Fallback>
+            </mc:AlternateContent>
           </a:graphicData>
         </a:graphic>
       </p:graphicFrame>
@@ -2006,7 +2107,7 @@
           <p:nvPr>
             <p:extLst>
               <p:ext uri="{D42A27DB-BD31-4B8C-83A1-F6EECF244321}">
-                <p14:modId xmlns="" xmlns:p14="http://schemas.microsoft.com/office/powerpoint/2010/main" val="3388720268"/>
+                <p14:modId xmlns:p14="http://schemas.microsoft.com/office/powerpoint/2010/main" val="3388720268"/>
               </p:ext>
             </p:extLst>
           </p:nvPr>
@@ -2017,9 +2118,59 @@
         </p:xfrm>
         <a:graphic>
           <a:graphicData uri="http://schemas.openxmlformats.org/presentationml/2006/ole">
-            <p:oleObj spid="_x0000_s9219" name="Image" r:id="rId4" imgW="4012698" imgH="2653968" progId="">
-              <p:embed/>
-            </p:oleObj>
+            <mc:AlternateContent xmlns:mc="http://schemas.openxmlformats.org/markup-compatibility/2006">
+              <mc:Choice xmlns:v="urn:schemas-microsoft-com:vml" Requires="v">
+                <p:oleObj spid="_x0000_s9265" name="Image" r:id="rId5" imgW="4012698" imgH="2653968" progId="">
+                  <p:embed/>
+                </p:oleObj>
+              </mc:Choice>
+              <mc:Fallback>
+                <p:oleObj name="Image" r:id="rId5" imgW="4012698" imgH="2653968" progId="">
+                  <p:embed/>
+                  <p:pic>
+                    <p:nvPicPr>
+                      <p:cNvPr id="0" name="Object 143"/>
+                      <p:cNvPicPr>
+                        <a:picLocks noChangeAspect="1" noChangeArrowheads="1"/>
+                      </p:cNvPicPr>
+                      <p:nvPr/>
+                    </p:nvPicPr>
+                    <p:blipFill>
+                      <a:blip r:embed="rId6">
+                        <a:extLst>
+                          <a:ext uri="{28A0092B-C50C-407E-A947-70E740481C1C}">
+                            <a14:useLocalDpi xmlns:a14="http://schemas.microsoft.com/office/drawing/2010/main" val="0"/>
+                          </a:ext>
+                        </a:extLst>
+                      </a:blip>
+                      <a:srcRect/>
+                      <a:stretch>
+                        <a:fillRect/>
+                      </a:stretch>
+                    </p:blipFill>
+                    <p:spPr bwMode="auto">
+                      <a:xfrm>
+                        <a:off x="95920" y="8604448"/>
+                        <a:ext cx="700120" cy="463054"/>
+                      </a:xfrm>
+                      <a:prstGeom prst="rect">
+                        <a:avLst/>
+                      </a:prstGeom>
+                      <a:noFill/>
+                      <a:extLst>
+                        <a:ext uri="{909E8E84-426E-40DD-AFC4-6F175D3DCCD1}">
+                          <a14:hiddenFill xmlns:a14="http://schemas.microsoft.com/office/drawing/2010/main">
+                            <a:solidFill>
+                              <a:srgbClr val="FFFFFF"/>
+                            </a:solidFill>
+                          </a14:hiddenFill>
+                        </a:ext>
+                      </a:extLst>
+                    </p:spPr>
+                  </p:pic>
+                </p:oleObj>
+              </mc:Fallback>
+            </mc:AlternateContent>
           </a:graphicData>
         </a:graphic>
       </p:graphicFrame>
@@ -2032,7 +2183,7 @@
           <p:nvPr/>
         </p:nvPicPr>
         <p:blipFill>
-          <a:blip r:embed="rId5" cstate="print"/>
+          <a:blip r:embed="rId7" cstate="print"/>
           <a:stretch>
             <a:fillRect/>
           </a:stretch>
@@ -2056,7 +2207,7 @@
           <p:nvPr/>
         </p:nvPicPr>
         <p:blipFill>
-          <a:blip r:embed="rId6" cstate="print"/>
+          <a:blip r:embed="rId8" cstate="print"/>
           <a:stretch>
             <a:fillRect/>
           </a:stretch>
@@ -2080,7 +2231,7 @@
           <p:nvPr/>
         </p:nvPicPr>
         <p:blipFill>
-          <a:blip r:embed="rId7" cstate="print"/>
+          <a:blip r:embed="rId9" cstate="print"/>
           <a:stretch>
             <a:fillRect/>
           </a:stretch>
@@ -2095,6 +2246,201 @@
           </a:prstGeom>
         </p:spPr>
       </p:pic>
+      <p:sp>
+        <p:nvSpPr>
+          <p:cNvPr id="10" name="TextBox 24"/>
+          <p:cNvSpPr txBox="1"/>
+          <p:nvPr/>
+        </p:nvSpPr>
+        <p:spPr>
+          <a:xfrm>
+            <a:off x="95920" y="1742980"/>
+            <a:ext cx="790601" cy="369332"/>
+          </a:xfrm>
+          <a:prstGeom prst="rect">
+            <a:avLst/>
+          </a:prstGeom>
+          <a:noFill/>
+        </p:spPr>
+        <p:txBody>
+          <a:bodyPr wrap="none" rtlCol="0">
+            <a:spAutoFit/>
+          </a:bodyPr>
+          <a:lstStyle/>
+          <a:p>
+            <a:r>
+              <a:rPr lang="de-DE" dirty="0" smtClean="0"/>
+              <a:t>Bühne</a:t>
+            </a:r>
+            <a:endParaRPr lang="de-DE" dirty="0"/>
+          </a:p>
+        </p:txBody>
+      </p:sp>
+      <p:sp>
+        <p:nvSpPr>
+          <p:cNvPr id="12" name="TextBox 24"/>
+          <p:cNvSpPr txBox="1"/>
+          <p:nvPr/>
+        </p:nvSpPr>
+        <p:spPr>
+          <a:xfrm>
+            <a:off x="3140968" y="4130687"/>
+            <a:ext cx="1603644" cy="369332"/>
+          </a:xfrm>
+          <a:prstGeom prst="rect">
+            <a:avLst/>
+          </a:prstGeom>
+          <a:noFill/>
+        </p:spPr>
+        <p:txBody>
+          <a:bodyPr wrap="none" rtlCol="0">
+            <a:spAutoFit/>
+          </a:bodyPr>
+          <a:lstStyle/>
+          <a:p>
+            <a:r>
+              <a:rPr lang="de-DE" dirty="0" smtClean="0"/>
+              <a:t>Bausteinkasten</a:t>
+            </a:r>
+            <a:endParaRPr lang="de-DE" dirty="0"/>
+          </a:p>
+        </p:txBody>
+      </p:sp>
+      <p:sp>
+        <p:nvSpPr>
+          <p:cNvPr id="13" name="TextBox 24"/>
+          <p:cNvSpPr txBox="1"/>
+          <p:nvPr/>
+        </p:nvSpPr>
+        <p:spPr>
+          <a:xfrm>
+            <a:off x="4594293" y="473395"/>
+            <a:ext cx="993670" cy="369332"/>
+          </a:xfrm>
+          <a:prstGeom prst="rect">
+            <a:avLst/>
+          </a:prstGeom>
+          <a:noFill/>
+        </p:spPr>
+        <p:txBody>
+          <a:bodyPr wrap="none" rtlCol="0">
+            <a:spAutoFit/>
+          </a:bodyPr>
+          <a:lstStyle/>
+          <a:p>
+            <a:r>
+              <a:rPr lang="de-DE" dirty="0" smtClean="0"/>
+              <a:t>Bauplatz</a:t>
+            </a:r>
+            <a:endParaRPr lang="de-DE" dirty="0"/>
+          </a:p>
+        </p:txBody>
+      </p:sp>
+      <p:cxnSp>
+        <p:nvCxnSpPr>
+          <p:cNvPr id="5" name="Gerade Verbindung mit Pfeil 4"/>
+          <p:cNvCxnSpPr>
+            <a:stCxn id="10" idx="3"/>
+          </p:cNvCxnSpPr>
+          <p:nvPr/>
+        </p:nvCxnSpPr>
+        <p:spPr>
+          <a:xfrm>
+            <a:off x="886521" y="1927646"/>
+            <a:ext cx="271229" cy="0"/>
+          </a:xfrm>
+          <a:prstGeom prst="straightConnector1">
+            <a:avLst/>
+          </a:prstGeom>
+          <a:ln>
+            <a:tailEnd type="triangle"/>
+          </a:ln>
+        </p:spPr>
+        <p:style>
+          <a:lnRef idx="1">
+            <a:schemeClr val="accent1"/>
+          </a:lnRef>
+          <a:fillRef idx="0">
+            <a:schemeClr val="accent1"/>
+          </a:fillRef>
+          <a:effectRef idx="0">
+            <a:schemeClr val="accent1"/>
+          </a:effectRef>
+          <a:fontRef idx="minor">
+            <a:schemeClr val="tx1"/>
+          </a:fontRef>
+        </p:style>
+      </p:cxnSp>
+      <p:cxnSp>
+        <p:nvCxnSpPr>
+          <p:cNvPr id="16" name="Gerade Verbindung mit Pfeil 15"/>
+          <p:cNvCxnSpPr>
+            <a:stCxn id="12" idx="0"/>
+          </p:cNvCxnSpPr>
+          <p:nvPr/>
+        </p:nvCxnSpPr>
+        <p:spPr>
+          <a:xfrm flipH="1" flipV="1">
+            <a:off x="3933056" y="3635896"/>
+            <a:ext cx="9734" cy="494791"/>
+          </a:xfrm>
+          <a:prstGeom prst="straightConnector1">
+            <a:avLst/>
+          </a:prstGeom>
+          <a:ln>
+            <a:tailEnd type="triangle"/>
+          </a:ln>
+        </p:spPr>
+        <p:style>
+          <a:lnRef idx="1">
+            <a:schemeClr val="accent1"/>
+          </a:lnRef>
+          <a:fillRef idx="0">
+            <a:schemeClr val="accent1"/>
+          </a:fillRef>
+          <a:effectRef idx="0">
+            <a:schemeClr val="accent1"/>
+          </a:effectRef>
+          <a:fontRef idx="minor">
+            <a:schemeClr val="tx1"/>
+          </a:fontRef>
+        </p:style>
+      </p:cxnSp>
+      <p:cxnSp>
+        <p:nvCxnSpPr>
+          <p:cNvPr id="21" name="Gerade Verbindung mit Pfeil 20"/>
+          <p:cNvCxnSpPr>
+            <a:stCxn id="13" idx="2"/>
+          </p:cNvCxnSpPr>
+          <p:nvPr/>
+        </p:nvCxnSpPr>
+        <p:spPr>
+          <a:xfrm>
+            <a:off x="5091128" y="842727"/>
+            <a:ext cx="0" cy="460447"/>
+          </a:xfrm>
+          <a:prstGeom prst="straightConnector1">
+            <a:avLst/>
+          </a:prstGeom>
+          <a:ln>
+            <a:tailEnd type="triangle"/>
+          </a:ln>
+        </p:spPr>
+        <p:style>
+          <a:lnRef idx="1">
+            <a:schemeClr val="accent1"/>
+          </a:lnRef>
+          <a:fillRef idx="0">
+            <a:schemeClr val="accent1"/>
+          </a:fillRef>
+          <a:effectRef idx="0">
+            <a:schemeClr val="accent1"/>
+          </a:effectRef>
+          <a:fontRef idx="minor">
+            <a:schemeClr val="tx1"/>
+          </a:fontRef>
+        </p:style>
+      </p:cxnSp>
     </p:spTree>
   </p:cSld>
   <p:clrMapOvr>
@@ -2279,7 +2625,7 @@
           <p:nvPr>
             <p:extLst>
               <p:ext uri="{D42A27DB-BD31-4B8C-83A1-F6EECF244321}">
-                <p14:modId xmlns="" xmlns:p14="http://schemas.microsoft.com/office/powerpoint/2010/main" val="682914404"/>
+                <p14:modId xmlns:p14="http://schemas.microsoft.com/office/powerpoint/2010/main" val="682914404"/>
               </p:ext>
             </p:extLst>
           </p:nvPr>
@@ -2290,9 +2636,59 @@
         </p:xfrm>
         <a:graphic>
           <a:graphicData uri="http://schemas.openxmlformats.org/presentationml/2006/ole">
-            <p:oleObj spid="_x0000_s2184" name="Image" r:id="rId3" imgW="3250794" imgH="2069841" progId="">
-              <p:embed/>
-            </p:oleObj>
+            <mc:AlternateContent xmlns:mc="http://schemas.openxmlformats.org/markup-compatibility/2006">
+              <mc:Choice xmlns:v="urn:schemas-microsoft-com:vml" Requires="v">
+                <p:oleObj spid="_x0000_s2230" name="Image" r:id="rId3" imgW="3250794" imgH="2069841" progId="">
+                  <p:embed/>
+                </p:oleObj>
+              </mc:Choice>
+              <mc:Fallback>
+                <p:oleObj name="Image" r:id="rId3" imgW="3250794" imgH="2069841" progId="">
+                  <p:embed/>
+                  <p:pic>
+                    <p:nvPicPr>
+                      <p:cNvPr id="0" name="Picture 136"/>
+                      <p:cNvPicPr>
+                        <a:picLocks noChangeAspect="1" noChangeArrowheads="1"/>
+                      </p:cNvPicPr>
+                      <p:nvPr/>
+                    </p:nvPicPr>
+                    <p:blipFill>
+                      <a:blip r:embed="rId4">
+                        <a:extLst>
+                          <a:ext uri="{28A0092B-C50C-407E-A947-70E740481C1C}">
+                            <a14:useLocalDpi xmlns:a14="http://schemas.microsoft.com/office/drawing/2010/main" val="0"/>
+                          </a:ext>
+                        </a:extLst>
+                      </a:blip>
+                      <a:srcRect/>
+                      <a:stretch>
+                        <a:fillRect/>
+                      </a:stretch>
+                    </p:blipFill>
+                    <p:spPr bwMode="auto">
+                      <a:xfrm>
+                        <a:off x="95920" y="4106853"/>
+                        <a:ext cx="617488" cy="393166"/>
+                      </a:xfrm>
+                      <a:prstGeom prst="rect">
+                        <a:avLst/>
+                      </a:prstGeom>
+                      <a:noFill/>
+                      <a:extLst>
+                        <a:ext uri="{909E8E84-426E-40DD-AFC4-6F175D3DCCD1}">
+                          <a14:hiddenFill xmlns:a14="http://schemas.microsoft.com/office/drawing/2010/main">
+                            <a:solidFill>
+                              <a:srgbClr val="FFFFFF"/>
+                            </a:solidFill>
+                          </a14:hiddenFill>
+                        </a:ext>
+                      </a:extLst>
+                    </p:spPr>
+                  </p:pic>
+                </p:oleObj>
+              </mc:Fallback>
+            </mc:AlternateContent>
           </a:graphicData>
         </a:graphic>
       </p:graphicFrame>
@@ -2305,7 +2701,7 @@
           <p:nvPr>
             <p:extLst>
               <p:ext uri="{D42A27DB-BD31-4B8C-83A1-F6EECF244321}">
-                <p14:modId xmlns="" xmlns:p14="http://schemas.microsoft.com/office/powerpoint/2010/main" val="3388720268"/>
+                <p14:modId xmlns:p14="http://schemas.microsoft.com/office/powerpoint/2010/main" val="3388720268"/>
               </p:ext>
             </p:extLst>
           </p:nvPr>
@@ -2316,9 +2712,59 @@
         </p:xfrm>
         <a:graphic>
           <a:graphicData uri="http://schemas.openxmlformats.org/presentationml/2006/ole">
-            <p:oleObj spid="_x0000_s2185" name="Image" r:id="rId4" imgW="4012698" imgH="2653968" progId="">
-              <p:embed/>
-            </p:oleObj>
+            <mc:AlternateContent xmlns:mc="http://schemas.openxmlformats.org/markup-compatibility/2006">
+              <mc:Choice xmlns:v="urn:schemas-microsoft-com:vml" Requires="v">
+                <p:oleObj spid="_x0000_s2231" name="Image" r:id="rId5" imgW="4012698" imgH="2653968" progId="">
+                  <p:embed/>
+                </p:oleObj>
+              </mc:Choice>
+              <mc:Fallback>
+                <p:oleObj name="Image" r:id="rId5" imgW="4012698" imgH="2653968" progId="">
+                  <p:embed/>
+                  <p:pic>
+                    <p:nvPicPr>
+                      <p:cNvPr id="0" name="Picture 137"/>
+                      <p:cNvPicPr>
+                        <a:picLocks noChangeAspect="1" noChangeArrowheads="1"/>
+                      </p:cNvPicPr>
+                      <p:nvPr/>
+                    </p:nvPicPr>
+                    <p:blipFill>
+                      <a:blip r:embed="rId6">
+                        <a:extLst>
+                          <a:ext uri="{28A0092B-C50C-407E-A947-70E740481C1C}">
+                            <a14:useLocalDpi xmlns:a14="http://schemas.microsoft.com/office/drawing/2010/main" val="0"/>
+                          </a:ext>
+                        </a:extLst>
+                      </a:blip>
+                      <a:srcRect/>
+                      <a:stretch>
+                        <a:fillRect/>
+                      </a:stretch>
+                    </p:blipFill>
+                    <p:spPr bwMode="auto">
+                      <a:xfrm>
+                        <a:off x="95920" y="8604448"/>
+                        <a:ext cx="700120" cy="463054"/>
+                      </a:xfrm>
+                      <a:prstGeom prst="rect">
+                        <a:avLst/>
+                      </a:prstGeom>
+                      <a:noFill/>
+                      <a:extLst>
+                        <a:ext uri="{909E8E84-426E-40DD-AFC4-6F175D3DCCD1}">
+                          <a14:hiddenFill xmlns:a14="http://schemas.microsoft.com/office/drawing/2010/main">
+                            <a:solidFill>
+                              <a:srgbClr val="FFFFFF"/>
+                            </a:solidFill>
+                          </a14:hiddenFill>
+                        </a:ext>
+                      </a:extLst>
+                    </p:spPr>
+                  </p:pic>
+                </p:oleObj>
+              </mc:Fallback>
+            </mc:AlternateContent>
           </a:graphicData>
         </a:graphic>
       </p:graphicFrame>
@@ -2331,7 +2777,7 @@
           <p:nvPr/>
         </p:nvPicPr>
         <p:blipFill rotWithShape="1">
-          <a:blip r:embed="rId5" cstate="print"/>
+          <a:blip r:embed="rId7" cstate="print"/>
           <a:srcRect l="6713"/>
           <a:stretch/>
         </p:blipFill>
@@ -2422,7 +2868,7 @@
           <p:nvPr/>
         </p:nvPicPr>
         <p:blipFill rotWithShape="1">
-          <a:blip r:embed="rId6" cstate="print"/>
+          <a:blip r:embed="rId8" cstate="print"/>
           <a:srcRect l="9921" t="58736" r="7403" b="16929"/>
           <a:stretch/>
         </p:blipFill>
@@ -2445,7 +2891,7 @@
           <p:nvPr/>
         </p:nvPicPr>
         <p:blipFill>
-          <a:blip r:embed="rId7" cstate="print"/>
+          <a:blip r:embed="rId9" cstate="print"/>
           <a:stretch>
             <a:fillRect/>
           </a:stretch>
@@ -2469,7 +2915,7 @@
           <p:nvPr/>
         </p:nvPicPr>
         <p:blipFill>
-          <a:blip r:embed="rId8" cstate="print"/>
+          <a:blip r:embed="rId10" cstate="print"/>
           <a:stretch>
             <a:fillRect/>
           </a:stretch>
@@ -2493,7 +2939,7 @@
           <p:nvPr/>
         </p:nvPicPr>
         <p:blipFill>
-          <a:blip r:embed="rId9" cstate="print"/>
+          <a:blip r:embed="rId11" cstate="print"/>
           <a:stretch>
             <a:fillRect/>
           </a:stretch>
@@ -2547,7 +2993,7 @@
           <p:nvPr/>
         </p:nvPicPr>
         <p:blipFill>
-          <a:blip r:embed="rId10" cstate="print"/>
+          <a:blip r:embed="rId12" cstate="print"/>
           <a:stretch>
             <a:fillRect/>
           </a:stretch>
@@ -2571,7 +3017,7 @@
           <p:nvPr/>
         </p:nvPicPr>
         <p:blipFill>
-          <a:blip r:embed="rId11" cstate="print"/>
+          <a:blip r:embed="rId13" cstate="print"/>
           <a:stretch>
             <a:fillRect/>
           </a:stretch>
@@ -2633,7 +3079,7 @@
           <p:nvPr/>
         </p:nvPicPr>
         <p:blipFill rotWithShape="1">
-          <a:blip r:embed="rId12" cstate="print"/>
+          <a:blip r:embed="rId14" cstate="print"/>
           <a:srcRect t="52111"/>
           <a:stretch/>
         </p:blipFill>
@@ -2656,7 +3102,7 @@
           <p:nvPr/>
         </p:nvPicPr>
         <p:blipFill>
-          <a:blip r:embed="rId13" cstate="print"/>
+          <a:blip r:embed="rId15" cstate="print"/>
           <a:stretch>
             <a:fillRect/>
           </a:stretch>
@@ -2680,7 +3126,7 @@
           <p:nvPr/>
         </p:nvPicPr>
         <p:blipFill>
-          <a:blip r:embed="rId14" cstate="print"/>
+          <a:blip r:embed="rId16" cstate="print"/>
           <a:stretch>
             <a:fillRect/>
           </a:stretch>
@@ -2744,7 +3190,7 @@
           <p:nvPr/>
         </p:nvPicPr>
         <p:blipFill>
-          <a:blip r:embed="rId15" cstate="print"/>
+          <a:blip r:embed="rId17" cstate="print"/>
           <a:stretch>
             <a:fillRect/>
           </a:stretch>
@@ -2762,7 +3208,7 @@
     </p:spTree>
     <p:extLst>
       <p:ext uri="{BB962C8B-B14F-4D97-AF65-F5344CB8AC3E}">
-        <p14:creationId xmlns="" xmlns:p14="http://schemas.microsoft.com/office/powerpoint/2010/main" val="3500365593"/>
+        <p14:creationId xmlns:p14="http://schemas.microsoft.com/office/powerpoint/2010/main" val="3500365593"/>
       </p:ext>
     </p:extLst>
   </p:cSld>
@@ -2843,7 +3289,7 @@
         <p:spPr>
           <a:xfrm>
             <a:off x="404664" y="7740352"/>
-            <a:ext cx="6453336" cy="978729"/>
+            <a:ext cx="6453336" cy="646331"/>
           </a:xfrm>
         </p:spPr>
         <p:txBody>
@@ -2852,27 +3298,13 @@
           <a:p>
             <a:r>
               <a:rPr lang="de-DE" dirty="0" smtClean="0"/>
-              <a:t>Probiere es mit allen Richtungen und verschiedenen Geschwindigkeiten aus.</a:t>
-            </a:r>
-          </a:p>
-          <a:p>
-            <a:r>
-              <a:rPr lang="de-DE" dirty="0"/>
-              <a:t>B</a:t>
-            </a:r>
-            <a:r>
-              <a:rPr lang="de-DE" dirty="0" smtClean="0"/>
-              <a:t>ewege den </a:t>
-            </a:r>
-            <a:r>
-              <a:rPr lang="de-DE" dirty="0" err="1" smtClean="0"/>
-              <a:t>mBot</a:t>
-            </a:r>
-            <a:r>
-              <a:rPr lang="de-DE" dirty="0" smtClean="0"/>
-              <a:t> nur mit der Fernbedienung</a:t>
-            </a:r>
-            <a:endParaRPr lang="de-DE" dirty="0"/>
+              <a:t>Probiere es mit allen Richtungen und verschiedenen Geschwindigkeiten aus</a:t>
+            </a:r>
+            <a:r>
+              <a:rPr lang="de-DE" dirty="0" smtClean="0"/>
+              <a:t>.</a:t>
+            </a:r>
+            <a:endParaRPr lang="de-DE" dirty="0" smtClean="0"/>
           </a:p>
         </p:txBody>
       </p:sp>
@@ -2888,8 +3320,8 @@
         </p:nvSpPr>
         <p:spPr>
           <a:xfrm>
-            <a:off x="1157750" y="12948"/>
-            <a:ext cx="4791530" cy="765175"/>
+            <a:off x="1052736" y="-66383"/>
+            <a:ext cx="4927880" cy="772284"/>
           </a:xfrm>
         </p:spPr>
         <p:txBody>
@@ -2898,7 +3330,7 @@
           <a:p>
             <a:r>
               <a:rPr lang="de-DE" dirty="0" smtClean="0"/>
-              <a:t>Den </a:t>
+              <a:t>Der </a:t>
             </a:r>
             <a:r>
               <a:rPr lang="de-DE" dirty="0" err="1" smtClean="0"/>
@@ -2906,7 +3338,11 @@
             </a:r>
             <a:r>
               <a:rPr lang="de-DE" dirty="0" smtClean="0"/>
-              <a:t> steuern!</a:t>
+              <a:t> </a:t>
+            </a:r>
+            <a:r>
+              <a:rPr lang="de-DE" dirty="0" smtClean="0"/>
+              <a:t>piept und blinkt!</a:t>
             </a:r>
             <a:endParaRPr lang="de-DE" dirty="0"/>
           </a:p>
@@ -2952,7 +3388,7 @@
           <p:nvPr>
             <p:extLst>
               <p:ext uri="{D42A27DB-BD31-4B8C-83A1-F6EECF244321}">
-                <p14:modId xmlns="" xmlns:p14="http://schemas.microsoft.com/office/powerpoint/2010/main" val="682914404"/>
+                <p14:modId xmlns:p14="http://schemas.microsoft.com/office/powerpoint/2010/main" val="682914404"/>
               </p:ext>
             </p:extLst>
           </p:nvPr>
@@ -2963,9 +3399,59 @@
         </p:xfrm>
         <a:graphic>
           <a:graphicData uri="http://schemas.openxmlformats.org/presentationml/2006/ole">
-            <p:oleObj spid="_x0000_s3210" name="Image" r:id="rId3" imgW="3250794" imgH="2069841" progId="">
-              <p:embed/>
-            </p:oleObj>
+            <mc:AlternateContent xmlns:mc="http://schemas.openxmlformats.org/markup-compatibility/2006">
+              <mc:Choice xmlns:v="urn:schemas-microsoft-com:vml" Requires="v">
+                <p:oleObj spid="_x0000_s3256" name="Image" r:id="rId3" imgW="3250794" imgH="2069841" progId="">
+                  <p:embed/>
+                </p:oleObj>
+              </mc:Choice>
+              <mc:Fallback>
+                <p:oleObj name="Image" r:id="rId3" imgW="3250794" imgH="2069841" progId="">
+                  <p:embed/>
+                  <p:pic>
+                    <p:nvPicPr>
+                      <p:cNvPr id="0" name="Picture 138"/>
+                      <p:cNvPicPr>
+                        <a:picLocks noChangeAspect="1" noChangeArrowheads="1"/>
+                      </p:cNvPicPr>
+                      <p:nvPr/>
+                    </p:nvPicPr>
+                    <p:blipFill>
+                      <a:blip r:embed="rId4">
+                        <a:extLst>
+                          <a:ext uri="{28A0092B-C50C-407E-A947-70E740481C1C}">
+                            <a14:useLocalDpi xmlns:a14="http://schemas.microsoft.com/office/drawing/2010/main" val="0"/>
+                          </a:ext>
+                        </a:extLst>
+                      </a:blip>
+                      <a:srcRect/>
+                      <a:stretch>
+                        <a:fillRect/>
+                      </a:stretch>
+                    </p:blipFill>
+                    <p:spPr bwMode="auto">
+                      <a:xfrm>
+                        <a:off x="95920" y="4106853"/>
+                        <a:ext cx="617488" cy="393166"/>
+                      </a:xfrm>
+                      <a:prstGeom prst="rect">
+                        <a:avLst/>
+                      </a:prstGeom>
+                      <a:noFill/>
+                      <a:extLst>
+                        <a:ext uri="{909E8E84-426E-40DD-AFC4-6F175D3DCCD1}">
+                          <a14:hiddenFill xmlns:a14="http://schemas.microsoft.com/office/drawing/2010/main">
+                            <a:solidFill>
+                              <a:srgbClr val="FFFFFF"/>
+                            </a:solidFill>
+                          </a14:hiddenFill>
+                        </a:ext>
+                      </a:extLst>
+                    </p:spPr>
+                  </p:pic>
+                </p:oleObj>
+              </mc:Fallback>
+            </mc:AlternateContent>
           </a:graphicData>
         </a:graphic>
       </p:graphicFrame>
@@ -2978,7 +3464,7 @@
           <p:nvPr>
             <p:extLst>
               <p:ext uri="{D42A27DB-BD31-4B8C-83A1-F6EECF244321}">
-                <p14:modId xmlns="" xmlns:p14="http://schemas.microsoft.com/office/powerpoint/2010/main" val="3388720268"/>
+                <p14:modId xmlns:p14="http://schemas.microsoft.com/office/powerpoint/2010/main" val="3388720268"/>
               </p:ext>
             </p:extLst>
           </p:nvPr>
@@ -2989,9 +3475,59 @@
         </p:xfrm>
         <a:graphic>
           <a:graphicData uri="http://schemas.openxmlformats.org/presentationml/2006/ole">
-            <p:oleObj spid="_x0000_s3211" name="Image" r:id="rId4" imgW="4012698" imgH="2653968" progId="">
-              <p:embed/>
-            </p:oleObj>
+            <mc:AlternateContent xmlns:mc="http://schemas.openxmlformats.org/markup-compatibility/2006">
+              <mc:Choice xmlns:v="urn:schemas-microsoft-com:vml" Requires="v">
+                <p:oleObj spid="_x0000_s3257" name="Image" r:id="rId5" imgW="4012698" imgH="2653968" progId="">
+                  <p:embed/>
+                </p:oleObj>
+              </mc:Choice>
+              <mc:Fallback>
+                <p:oleObj name="Image" r:id="rId5" imgW="4012698" imgH="2653968" progId="">
+                  <p:embed/>
+                  <p:pic>
+                    <p:nvPicPr>
+                      <p:cNvPr id="0" name="Picture 139"/>
+                      <p:cNvPicPr>
+                        <a:picLocks noChangeAspect="1" noChangeArrowheads="1"/>
+                      </p:cNvPicPr>
+                      <p:nvPr/>
+                    </p:nvPicPr>
+                    <p:blipFill>
+                      <a:blip r:embed="rId6">
+                        <a:extLst>
+                          <a:ext uri="{28A0092B-C50C-407E-A947-70E740481C1C}">
+                            <a14:useLocalDpi xmlns:a14="http://schemas.microsoft.com/office/drawing/2010/main" val="0"/>
+                          </a:ext>
+                        </a:extLst>
+                      </a:blip>
+                      <a:srcRect/>
+                      <a:stretch>
+                        <a:fillRect/>
+                      </a:stretch>
+                    </p:blipFill>
+                    <p:spPr bwMode="auto">
+                      <a:xfrm>
+                        <a:off x="95920" y="8604448"/>
+                        <a:ext cx="700120" cy="463054"/>
+                      </a:xfrm>
+                      <a:prstGeom prst="rect">
+                        <a:avLst/>
+                      </a:prstGeom>
+                      <a:noFill/>
+                      <a:extLst>
+                        <a:ext uri="{909E8E84-426E-40DD-AFC4-6F175D3DCCD1}">
+                          <a14:hiddenFill xmlns:a14="http://schemas.microsoft.com/office/drawing/2010/main">
+                            <a:solidFill>
+                              <a:srgbClr val="FFFFFF"/>
+                            </a:solidFill>
+                          </a14:hiddenFill>
+                        </a:ext>
+                      </a:extLst>
+                    </p:spPr>
+                  </p:pic>
+                </p:oleObj>
+              </mc:Fallback>
+            </mc:AlternateContent>
           </a:graphicData>
         </a:graphic>
       </p:graphicFrame>
@@ -3034,7 +3570,7 @@
           <p:nvPr/>
         </p:nvPicPr>
         <p:blipFill rotWithShape="1">
-          <a:blip r:embed="rId5" cstate="print"/>
+          <a:blip r:embed="rId7" cstate="print"/>
           <a:srcRect b="43207"/>
           <a:stretch/>
         </p:blipFill>
@@ -3057,7 +3593,7 @@
           <p:nvPr/>
         </p:nvPicPr>
         <p:blipFill>
-          <a:blip r:embed="rId6" cstate="print"/>
+          <a:blip r:embed="rId8" cstate="print"/>
           <a:stretch>
             <a:fillRect/>
           </a:stretch>
@@ -3111,7 +3647,7 @@
           <p:nvPr/>
         </p:nvPicPr>
         <p:blipFill>
-          <a:blip r:embed="rId7" cstate="print"/>
+          <a:blip r:embed="rId9" cstate="print"/>
           <a:stretch>
             <a:fillRect/>
           </a:stretch>
@@ -3135,114 +3671,6 @@
           <p:nvPr/>
         </p:nvPicPr>
         <p:blipFill>
-          <a:blip r:embed="rId8" cstate="print"/>
-          <a:stretch>
-            <a:fillRect/>
-          </a:stretch>
-        </p:blipFill>
-        <p:spPr>
-          <a:xfrm>
-            <a:off x="445980" y="5448397"/>
-            <a:ext cx="1095375" cy="238125"/>
-          </a:xfrm>
-          <a:prstGeom prst="rect">
-            <a:avLst/>
-          </a:prstGeom>
-        </p:spPr>
-      </p:pic>
-      <p:sp>
-        <p:nvSpPr>
-          <p:cNvPr id="31" name="TextBox 24"/>
-          <p:cNvSpPr txBox="1"/>
-          <p:nvPr/>
-        </p:nvSpPr>
-        <p:spPr>
-          <a:xfrm>
-            <a:off x="404664" y="5607019"/>
-            <a:ext cx="550151" cy="369332"/>
-          </a:xfrm>
-          <a:prstGeom prst="rect">
-            <a:avLst/>
-          </a:prstGeom>
-          <a:noFill/>
-        </p:spPr>
-        <p:txBody>
-          <a:bodyPr wrap="none" rtlCol="0">
-            <a:spAutoFit/>
-          </a:bodyPr>
-          <a:lstStyle/>
-          <a:p>
-            <a:r>
-              <a:rPr lang="de-DE" dirty="0" smtClean="0"/>
-              <a:t>und</a:t>
-            </a:r>
-            <a:endParaRPr lang="de-DE" dirty="0"/>
-          </a:p>
-        </p:txBody>
-      </p:sp>
-      <p:pic>
-        <p:nvPicPr>
-          <p:cNvPr id="10" name="Grafik 9"/>
-          <p:cNvPicPr>
-            <a:picLocks noChangeAspect="1"/>
-          </p:cNvPicPr>
-          <p:nvPr/>
-        </p:nvPicPr>
-        <p:blipFill>
-          <a:blip r:embed="rId9" cstate="print"/>
-          <a:stretch>
-            <a:fillRect/>
-          </a:stretch>
-        </p:blipFill>
-        <p:spPr>
-          <a:xfrm>
-            <a:off x="438332" y="6265874"/>
-            <a:ext cx="2324100" cy="1238250"/>
-          </a:xfrm>
-          <a:prstGeom prst="rect">
-            <a:avLst/>
-          </a:prstGeom>
-        </p:spPr>
-      </p:pic>
-      <p:sp>
-        <p:nvSpPr>
-          <p:cNvPr id="39" name="TextBox 24"/>
-          <p:cNvSpPr txBox="1"/>
-          <p:nvPr/>
-        </p:nvSpPr>
-        <p:spPr>
-          <a:xfrm>
-            <a:off x="3369584" y="5681545"/>
-            <a:ext cx="2356543" cy="369332"/>
-          </a:xfrm>
-          <a:prstGeom prst="rect">
-            <a:avLst/>
-          </a:prstGeom>
-          <a:noFill/>
-        </p:spPr>
-        <p:txBody>
-          <a:bodyPr wrap="none" rtlCol="0">
-            <a:spAutoFit/>
-          </a:bodyPr>
-          <a:lstStyle/>
-          <a:p>
-            <a:r>
-              <a:rPr lang="de-DE" dirty="0" smtClean="0"/>
-              <a:t>Mit der Fernbedienung</a:t>
-            </a:r>
-            <a:endParaRPr lang="de-DE" dirty="0"/>
-          </a:p>
-        </p:txBody>
-      </p:sp>
-      <p:pic>
-        <p:nvPicPr>
-          <p:cNvPr id="11" name="Grafik 10"/>
-          <p:cNvPicPr>
-            <a:picLocks noChangeAspect="1"/>
-          </p:cNvPicPr>
-          <p:nvPr/>
-        </p:nvPicPr>
-        <p:blipFill>
           <a:blip r:embed="rId10" cstate="print"/>
           <a:stretch>
             <a:fillRect/>
@@ -3250,17 +3678,47 @@
         </p:blipFill>
         <p:spPr>
           <a:xfrm>
-            <a:off x="3370307" y="6182208"/>
-            <a:ext cx="2838450" cy="628650"/>
+            <a:off x="445980" y="5448397"/>
+            <a:ext cx="1095375" cy="238125"/>
           </a:xfrm>
           <a:prstGeom prst="rect">
             <a:avLst/>
           </a:prstGeom>
         </p:spPr>
       </p:pic>
+      <p:sp>
+        <p:nvSpPr>
+          <p:cNvPr id="31" name="TextBox 24"/>
+          <p:cNvSpPr txBox="1"/>
+          <p:nvPr/>
+        </p:nvSpPr>
+        <p:spPr>
+          <a:xfrm>
+            <a:off x="404664" y="5607019"/>
+            <a:ext cx="550151" cy="369332"/>
+          </a:xfrm>
+          <a:prstGeom prst="rect">
+            <a:avLst/>
+          </a:prstGeom>
+          <a:noFill/>
+        </p:spPr>
+        <p:txBody>
+          <a:bodyPr wrap="none" rtlCol="0">
+            <a:spAutoFit/>
+          </a:bodyPr>
+          <a:lstStyle/>
+          <a:p>
+            <a:r>
+              <a:rPr lang="de-DE" dirty="0" smtClean="0"/>
+              <a:t>und</a:t>
+            </a:r>
+            <a:endParaRPr lang="de-DE" dirty="0"/>
+          </a:p>
+        </p:txBody>
+      </p:sp>
       <p:pic>
         <p:nvPicPr>
-          <p:cNvPr id="2" name="Grafik 1"/>
+          <p:cNvPr id="10" name="Grafik 9"/>
           <p:cNvPicPr>
             <a:picLocks noChangeAspect="1"/>
           </p:cNvPicPr>
@@ -3274,6 +3732,60 @@
         </p:blipFill>
         <p:spPr>
           <a:xfrm>
+            <a:off x="438332" y="6265874"/>
+            <a:ext cx="2324100" cy="1238250"/>
+          </a:xfrm>
+          <a:prstGeom prst="rect">
+            <a:avLst/>
+          </a:prstGeom>
+        </p:spPr>
+      </p:pic>
+      <p:sp>
+        <p:nvSpPr>
+          <p:cNvPr id="39" name="TextBox 24"/>
+          <p:cNvSpPr txBox="1"/>
+          <p:nvPr/>
+        </p:nvSpPr>
+        <p:spPr>
+          <a:xfrm>
+            <a:off x="3370307" y="5382793"/>
+            <a:ext cx="2000163" cy="369332"/>
+          </a:xfrm>
+          <a:prstGeom prst="rect">
+            <a:avLst/>
+          </a:prstGeom>
+          <a:noFill/>
+        </p:spPr>
+        <p:txBody>
+          <a:bodyPr wrap="none" rtlCol="0">
+            <a:spAutoFit/>
+          </a:bodyPr>
+          <a:lstStyle/>
+          <a:p>
+            <a:r>
+              <a:rPr lang="de-DE" dirty="0" smtClean="0"/>
+              <a:t>Der Not-Aus Knopf!</a:t>
+            </a:r>
+            <a:endParaRPr lang="de-DE" dirty="0"/>
+          </a:p>
+        </p:txBody>
+      </p:sp>
+      <p:pic>
+        <p:nvPicPr>
+          <p:cNvPr id="2" name="Grafik 1"/>
+          <p:cNvPicPr>
+            <a:picLocks noChangeAspect="1"/>
+          </p:cNvPicPr>
+          <p:nvPr/>
+        </p:nvPicPr>
+        <p:blipFill>
+          <a:blip r:embed="rId12" cstate="print"/>
+          <a:stretch>
+            <a:fillRect/>
+          </a:stretch>
+        </p:blipFill>
+        <p:spPr>
+          <a:xfrm>
             <a:off x="204969" y="2565174"/>
             <a:ext cx="1076325" cy="209550"/>
           </a:xfrm>
@@ -3291,14 +3803,14 @@
           <p:nvPr/>
         </p:nvPicPr>
         <p:blipFill>
-          <a:blip r:embed="rId12" cstate="print"/>
+          <a:blip r:embed="rId13" cstate="print"/>
           <a:stretch>
             <a:fillRect/>
           </a:stretch>
         </p:blipFill>
         <p:spPr>
           <a:xfrm>
-            <a:off x="1642990" y="5496299"/>
+            <a:off x="1642990" y="5465869"/>
             <a:ext cx="1076325" cy="200025"/>
           </a:xfrm>
           <a:prstGeom prst="rect">
@@ -3315,7 +3827,7 @@
           <p:nvPr/>
         </p:nvPicPr>
         <p:blipFill>
-          <a:blip r:embed="rId13" cstate="print"/>
+          <a:blip r:embed="rId14" cstate="print"/>
           <a:stretch>
             <a:fillRect/>
           </a:stretch>
@@ -3330,10 +3842,34 @@
           </a:prstGeom>
         </p:spPr>
       </p:pic>
+      <p:pic>
+        <p:nvPicPr>
+          <p:cNvPr id="24" name="Grafik 23"/>
+          <p:cNvPicPr>
+            <a:picLocks noChangeAspect="1"/>
+          </p:cNvPicPr>
+          <p:nvPr/>
+        </p:nvPicPr>
+        <p:blipFill>
+          <a:blip r:embed="rId15" cstate="print"/>
+          <a:stretch>
+            <a:fillRect/>
+          </a:stretch>
+        </p:blipFill>
+        <p:spPr>
+          <a:xfrm>
+            <a:off x="3370307" y="5856299"/>
+            <a:ext cx="2266950" cy="819150"/>
+          </a:xfrm>
+          <a:prstGeom prst="rect">
+            <a:avLst/>
+          </a:prstGeom>
+        </p:spPr>
+      </p:pic>
     </p:spTree>
     <p:extLst>
       <p:ext uri="{BB962C8B-B14F-4D97-AF65-F5344CB8AC3E}">
-        <p14:creationId xmlns="" xmlns:p14="http://schemas.microsoft.com/office/powerpoint/2010/main" val="2154040751"/>
+        <p14:creationId xmlns:p14="http://schemas.microsoft.com/office/powerpoint/2010/main" val="2154040751"/>
       </p:ext>
     </p:extLst>
   </p:cSld>
@@ -3529,9 +4065,59 @@
         </p:xfrm>
         <a:graphic>
           <a:graphicData uri="http://schemas.openxmlformats.org/presentationml/2006/ole">
-            <p:oleObj spid="_x0000_s5218" name="Image" r:id="rId3" imgW="3250794" imgH="2069841" progId="">
-              <p:embed/>
-            </p:oleObj>
+            <mc:AlternateContent xmlns:mc="http://schemas.openxmlformats.org/markup-compatibility/2006">
+              <mc:Choice xmlns:v="urn:schemas-microsoft-com:vml" Requires="v">
+                <p:oleObj spid="_x0000_s5264" name="Image" r:id="rId3" imgW="3250794" imgH="2069841" progId="">
+                  <p:embed/>
+                </p:oleObj>
+              </mc:Choice>
+              <mc:Fallback>
+                <p:oleObj name="Image" r:id="rId3" imgW="3250794" imgH="2069841" progId="">
+                  <p:embed/>
+                  <p:pic>
+                    <p:nvPicPr>
+                      <p:cNvPr id="0" name="Picture 98"/>
+                      <p:cNvPicPr>
+                        <a:picLocks noChangeAspect="1" noChangeArrowheads="1"/>
+                      </p:cNvPicPr>
+                      <p:nvPr/>
+                    </p:nvPicPr>
+                    <p:blipFill>
+                      <a:blip r:embed="rId4">
+                        <a:extLst>
+                          <a:ext uri="{28A0092B-C50C-407E-A947-70E740481C1C}">
+                            <a14:useLocalDpi xmlns:a14="http://schemas.microsoft.com/office/drawing/2010/main" val="0"/>
+                          </a:ext>
+                        </a:extLst>
+                      </a:blip>
+                      <a:srcRect/>
+                      <a:stretch>
+                        <a:fillRect/>
+                      </a:stretch>
+                    </p:blipFill>
+                    <p:spPr bwMode="auto">
+                      <a:xfrm>
+                        <a:off x="95920" y="4106853"/>
+                        <a:ext cx="617488" cy="393166"/>
+                      </a:xfrm>
+                      <a:prstGeom prst="rect">
+                        <a:avLst/>
+                      </a:prstGeom>
+                      <a:noFill/>
+                      <a:extLst>
+                        <a:ext uri="{909E8E84-426E-40DD-AFC4-6F175D3DCCD1}">
+                          <a14:hiddenFill xmlns:a14="http://schemas.microsoft.com/office/drawing/2010/main">
+                            <a:solidFill>
+                              <a:srgbClr val="FFFFFF"/>
+                            </a:solidFill>
+                          </a14:hiddenFill>
+                        </a:ext>
+                      </a:extLst>
+                    </p:spPr>
+                  </p:pic>
+                </p:oleObj>
+              </mc:Fallback>
+            </mc:AlternateContent>
           </a:graphicData>
         </a:graphic>
       </p:graphicFrame>
@@ -3551,9 +4137,59 @@
         </p:xfrm>
         <a:graphic>
           <a:graphicData uri="http://schemas.openxmlformats.org/presentationml/2006/ole">
-            <p:oleObj spid="_x0000_s5219" name="Image" r:id="rId4" imgW="4012698" imgH="2653968" progId="">
-              <p:embed/>
-            </p:oleObj>
+            <mc:AlternateContent xmlns:mc="http://schemas.openxmlformats.org/markup-compatibility/2006">
+              <mc:Choice xmlns:v="urn:schemas-microsoft-com:vml" Requires="v">
+                <p:oleObj spid="_x0000_s5265" name="Image" r:id="rId5" imgW="4012698" imgH="2653968" progId="">
+                  <p:embed/>
+                </p:oleObj>
+              </mc:Choice>
+              <mc:Fallback>
+                <p:oleObj name="Image" r:id="rId5" imgW="4012698" imgH="2653968" progId="">
+                  <p:embed/>
+                  <p:pic>
+                    <p:nvPicPr>
+                      <p:cNvPr id="0" name="Picture 99"/>
+                      <p:cNvPicPr>
+                        <a:picLocks noChangeAspect="1" noChangeArrowheads="1"/>
+                      </p:cNvPicPr>
+                      <p:nvPr/>
+                    </p:nvPicPr>
+                    <p:blipFill>
+                      <a:blip r:embed="rId6">
+                        <a:extLst>
+                          <a:ext uri="{28A0092B-C50C-407E-A947-70E740481C1C}">
+                            <a14:useLocalDpi xmlns:a14="http://schemas.microsoft.com/office/drawing/2010/main" val="0"/>
+                          </a:ext>
+                        </a:extLst>
+                      </a:blip>
+                      <a:srcRect/>
+                      <a:stretch>
+                        <a:fillRect/>
+                      </a:stretch>
+                    </p:blipFill>
+                    <p:spPr bwMode="auto">
+                      <a:xfrm>
+                        <a:off x="95920" y="8604448"/>
+                        <a:ext cx="700120" cy="463054"/>
+                      </a:xfrm>
+                      <a:prstGeom prst="rect">
+                        <a:avLst/>
+                      </a:prstGeom>
+                      <a:noFill/>
+                      <a:extLst>
+                        <a:ext uri="{909E8E84-426E-40DD-AFC4-6F175D3DCCD1}">
+                          <a14:hiddenFill xmlns:a14="http://schemas.microsoft.com/office/drawing/2010/main">
+                            <a:solidFill>
+                              <a:srgbClr val="FFFFFF"/>
+                            </a:solidFill>
+                          </a14:hiddenFill>
+                        </a:ext>
+                      </a:extLst>
+                    </p:spPr>
+                  </p:pic>
+                </p:oleObj>
+              </mc:Fallback>
+            </mc:AlternateContent>
           </a:graphicData>
         </a:graphic>
       </p:graphicFrame>
@@ -3566,7 +4202,7 @@
           <p:nvPr/>
         </p:nvPicPr>
         <p:blipFill>
-          <a:blip r:embed="rId5" cstate="print"/>
+          <a:blip r:embed="rId7" cstate="print"/>
           <a:stretch>
             <a:fillRect/>
           </a:stretch>
@@ -3590,7 +4226,7 @@
           <p:nvPr/>
         </p:nvPicPr>
         <p:blipFill>
-          <a:blip r:embed="rId6" cstate="print"/>
+          <a:blip r:embed="rId8" cstate="print"/>
           <a:stretch>
             <a:fillRect/>
           </a:stretch>
@@ -3638,6 +4274,54 @@
       <p:pic>
         <p:nvPicPr>
           <p:cNvPr id="25" name="Grafik 24"/>
+          <p:cNvPicPr>
+            <a:picLocks noChangeAspect="1"/>
+          </p:cNvPicPr>
+          <p:nvPr/>
+        </p:nvPicPr>
+        <p:blipFill>
+          <a:blip r:embed="rId9" cstate="print"/>
+          <a:stretch>
+            <a:fillRect/>
+          </a:stretch>
+        </p:blipFill>
+        <p:spPr>
+          <a:xfrm>
+            <a:off x="1884255" y="5308665"/>
+            <a:ext cx="1076325" cy="200025"/>
+          </a:xfrm>
+          <a:prstGeom prst="rect">
+            <a:avLst/>
+          </a:prstGeom>
+        </p:spPr>
+      </p:pic>
+      <p:pic>
+        <p:nvPicPr>
+          <p:cNvPr id="26" name="Grafik 25"/>
+          <p:cNvPicPr>
+            <a:picLocks noChangeAspect="1"/>
+          </p:cNvPicPr>
+          <p:nvPr/>
+        </p:nvPicPr>
+        <p:blipFill>
+          <a:blip r:embed="rId10" cstate="print"/>
+          <a:stretch>
+            <a:fillRect/>
+          </a:stretch>
+        </p:blipFill>
+        <p:spPr>
+          <a:xfrm>
+            <a:off x="1884255" y="5787891"/>
+            <a:ext cx="1076325" cy="209550"/>
+          </a:xfrm>
+          <a:prstGeom prst="rect">
+            <a:avLst/>
+          </a:prstGeom>
+        </p:spPr>
+      </p:pic>
+      <p:pic>
+        <p:nvPicPr>
+          <p:cNvPr id="29" name="Grafik 28"/>
           <p:cNvPicPr>
             <a:picLocks noChangeAspect="1"/>
           </p:cNvPicPr>
@@ -3651,55 +4335,7 @@
         </p:blipFill>
         <p:spPr>
           <a:xfrm>
-            <a:off x="1884255" y="5308665"/>
-            <a:ext cx="1076325" cy="200025"/>
-          </a:xfrm>
-          <a:prstGeom prst="rect">
-            <a:avLst/>
-          </a:prstGeom>
-        </p:spPr>
-      </p:pic>
-      <p:pic>
-        <p:nvPicPr>
-          <p:cNvPr id="26" name="Grafik 25"/>
-          <p:cNvPicPr>
-            <a:picLocks noChangeAspect="1"/>
-          </p:cNvPicPr>
-          <p:nvPr/>
-        </p:nvPicPr>
-        <p:blipFill>
-          <a:blip r:embed="rId8" cstate="print"/>
-          <a:stretch>
-            <a:fillRect/>
-          </a:stretch>
-        </p:blipFill>
-        <p:spPr>
-          <a:xfrm>
-            <a:off x="1884255" y="5787891"/>
-            <a:ext cx="1076325" cy="209550"/>
-          </a:xfrm>
-          <a:prstGeom prst="rect">
-            <a:avLst/>
-          </a:prstGeom>
-        </p:spPr>
-      </p:pic>
-      <p:pic>
-        <p:nvPicPr>
-          <p:cNvPr id="29" name="Grafik 28"/>
-          <p:cNvPicPr>
-            <a:picLocks noChangeAspect="1"/>
-          </p:cNvPicPr>
-          <p:nvPr/>
-        </p:nvPicPr>
-        <p:blipFill>
-          <a:blip r:embed="rId5" cstate="print"/>
-          <a:stretch>
-            <a:fillRect/>
-          </a:stretch>
-        </p:blipFill>
-        <p:spPr>
-          <a:xfrm>
-            <a:off x="400604" y="747635"/>
+            <a:off x="391596" y="684093"/>
             <a:ext cx="1085850" cy="200025"/>
           </a:xfrm>
           <a:prstGeom prst="rect">
@@ -3716,14 +4352,14 @@
           <p:nvPr/>
         </p:nvPicPr>
         <p:blipFill>
-          <a:blip r:embed="rId8" cstate="print"/>
+          <a:blip r:embed="rId10" cstate="print"/>
           <a:stretch>
             <a:fillRect/>
           </a:stretch>
         </p:blipFill>
         <p:spPr>
           <a:xfrm>
-            <a:off x="1745517" y="737830"/>
+            <a:off x="1740767" y="687891"/>
             <a:ext cx="1076325" cy="209550"/>
           </a:xfrm>
           <a:prstGeom prst="rect">
@@ -3740,7 +4376,7 @@
           <p:nvPr/>
         </p:nvPicPr>
         <p:blipFill>
-          <a:blip r:embed="rId9" cstate="print"/>
+          <a:blip r:embed="rId11" cstate="print"/>
           <a:stretch>
             <a:fillRect/>
           </a:stretch>
@@ -3763,7 +4399,7 @@
         </p:nvSpPr>
         <p:spPr>
           <a:xfrm>
-            <a:off x="445980" y="1321946"/>
+            <a:off x="445980" y="1285577"/>
             <a:ext cx="2805512" cy="646331"/>
           </a:xfrm>
           <a:prstGeom prst="rect">
@@ -3800,14 +4436,14 @@
           <p:nvPr/>
         </p:nvPicPr>
         <p:blipFill>
-          <a:blip r:embed="rId10" cstate="print"/>
+          <a:blip r:embed="rId12" cstate="print"/>
           <a:stretch>
             <a:fillRect/>
           </a:stretch>
         </p:blipFill>
         <p:spPr>
           <a:xfrm>
-            <a:off x="3315868" y="1923574"/>
+            <a:off x="3349688" y="1321946"/>
             <a:ext cx="2952750" cy="1104900"/>
           </a:xfrm>
           <a:prstGeom prst="rect">
@@ -3824,7 +4460,7 @@
           <p:nvPr/>
         </p:nvPicPr>
         <p:blipFill>
-          <a:blip r:embed="rId11" cstate="print"/>
+          <a:blip r:embed="rId13" cstate="print"/>
           <a:stretch>
             <a:fillRect/>
           </a:stretch>
@@ -3924,7 +4560,7 @@
           <p:nvPr/>
         </p:nvPicPr>
         <p:blipFill>
-          <a:blip r:embed="rId12" cstate="print"/>
+          <a:blip r:embed="rId14" cstate="print"/>
           <a:stretch>
             <a:fillRect/>
           </a:stretch>
@@ -3939,30 +4575,6 @@
           </a:prstGeom>
         </p:spPr>
       </p:pic>
-      <p:pic>
-        <p:nvPicPr>
-          <p:cNvPr id="27" name="Grafik 26"/>
-          <p:cNvPicPr>
-            <a:picLocks noChangeAspect="1"/>
-          </p:cNvPicPr>
-          <p:nvPr/>
-        </p:nvPicPr>
-        <p:blipFill>
-          <a:blip r:embed="rId13" cstate="print"/>
-          <a:stretch>
-            <a:fillRect/>
-          </a:stretch>
-        </p:blipFill>
-        <p:spPr>
-          <a:xfrm>
-            <a:off x="3408758" y="747635"/>
-            <a:ext cx="2266950" cy="819150"/>
-          </a:xfrm>
-          <a:prstGeom prst="rect">
-            <a:avLst/>
-          </a:prstGeom>
-        </p:spPr>
-      </p:pic>
       <p:sp>
         <p:nvSpPr>
           <p:cNvPr id="28" name="TextBox 24"/>
@@ -3971,7 +4583,7 @@
         </p:nvSpPr>
         <p:spPr>
           <a:xfrm>
-            <a:off x="3284984" y="1547476"/>
+            <a:off x="3251492" y="889898"/>
             <a:ext cx="2884892" cy="369332"/>
           </a:xfrm>
           <a:prstGeom prst="rect">
@@ -4010,14 +4622,14 @@
           <p:nvPr/>
         </p:nvPicPr>
         <p:blipFill>
-          <a:blip r:embed="rId7" cstate="print"/>
+          <a:blip r:embed="rId9" cstate="print"/>
           <a:stretch>
             <a:fillRect/>
           </a:stretch>
         </p:blipFill>
         <p:spPr>
           <a:xfrm>
-            <a:off x="908688" y="1088792"/>
+            <a:off x="1026391" y="1006352"/>
             <a:ext cx="1076325" cy="200025"/>
           </a:xfrm>
           <a:prstGeom prst="rect">
@@ -4025,40 +4637,10 @@
           </a:prstGeom>
         </p:spPr>
       </p:pic>
-      <p:sp>
-        <p:nvSpPr>
-          <p:cNvPr id="35" name="TextBox 24"/>
-          <p:cNvSpPr txBox="1"/>
-          <p:nvPr/>
-        </p:nvSpPr>
-        <p:spPr>
-          <a:xfrm>
-            <a:off x="3284984" y="419306"/>
-            <a:ext cx="3303981" cy="369332"/>
-          </a:xfrm>
-          <a:prstGeom prst="rect">
-            <a:avLst/>
-          </a:prstGeom>
-          <a:noFill/>
-        </p:spPr>
-        <p:txBody>
-          <a:bodyPr wrap="square" rtlCol="0">
-            <a:spAutoFit/>
-          </a:bodyPr>
-          <a:lstStyle/>
-          <a:p>
-            <a:r>
-              <a:rPr lang="de-DE" dirty="0" smtClean="0"/>
-              <a:t>Wir bauen einen „Not aus“</a:t>
-            </a:r>
-            <a:endParaRPr lang="de-DE" dirty="0"/>
-          </a:p>
-        </p:txBody>
-      </p:sp>
     </p:spTree>
     <p:extLst>
       <p:ext uri="{BB962C8B-B14F-4D97-AF65-F5344CB8AC3E}">
-        <p14:creationId xmlns="" xmlns:p14="http://schemas.microsoft.com/office/powerpoint/2010/main" val="681921195"/>
+        <p14:creationId xmlns:p14="http://schemas.microsoft.com/office/powerpoint/2010/main" val="681921195"/>
       </p:ext>
     </p:extLst>
   </p:cSld>
@@ -4122,7 +4704,15 @@
             </a:r>
             <a:r>
               <a:rPr lang="de-DE" dirty="0" smtClean="0"/>
-              <a:t> nach vorne und nach hinten fahren. Verändere die Geschwindigkeiten und nehme Licht und dazu.</a:t>
+              <a:t> nach vorne und nach hinten fahren. Verändere die Geschwindigkeiten und nehme Licht </a:t>
+            </a:r>
+            <a:r>
+              <a:rPr lang="de-DE" dirty="0" smtClean="0"/>
+              <a:t>dazu</a:t>
+            </a:r>
+            <a:r>
+              <a:rPr lang="de-DE" dirty="0" smtClean="0"/>
+              <a:t>.</a:t>
             </a:r>
           </a:p>
           <a:p>
@@ -4183,12 +4773,41 @@
           </a:p>
           <a:p>
             <a:r>
+              <a:rPr lang="de-DE" dirty="0" smtClean="0"/>
+              <a:t>Bei Hindernissen soll der </a:t>
+            </a:r>
+            <a:r>
+              <a:rPr lang="de-DE" dirty="0" err="1" smtClean="0"/>
+              <a:t>mBot</a:t>
+            </a:r>
+            <a:r>
+              <a:rPr lang="de-DE" dirty="0" smtClean="0"/>
+              <a:t> sich umschauen und in die </a:t>
+            </a:r>
+          </a:p>
+          <a:p>
+            <a:r>
               <a:rPr lang="de-DE" dirty="0"/>
               <a:t> </a:t>
             </a:r>
             <a:r>
               <a:rPr lang="de-DE" dirty="0" smtClean="0"/>
-              <a:t>   Probiere es aus, dass der </a:t>
+              <a:t>      </a:t>
+            </a:r>
+            <a:r>
+              <a:rPr lang="de-DE" dirty="0" smtClean="0"/>
+              <a:t>Richtung fahren, wo mehr Platz ist.</a:t>
+            </a:r>
+            <a:endParaRPr lang="de-DE" dirty="0" smtClean="0"/>
+          </a:p>
+          <a:p>
+            <a:r>
+              <a:rPr lang="de-DE" dirty="0"/>
+              <a:t> </a:t>
+            </a:r>
+            <a:r>
+              <a:rPr lang="de-DE" dirty="0" smtClean="0"/>
+              <a:t>     Lasse den </a:t>
             </a:r>
             <a:r>
               <a:rPr lang="de-DE" dirty="0" err="1" smtClean="0"/>
@@ -4196,35 +4815,15 @@
             </a:r>
             <a:r>
               <a:rPr lang="de-DE" dirty="0" smtClean="0"/>
-              <a:t> sich umschaut und in die</a:t>
-            </a:r>
-          </a:p>
-          <a:p>
-            <a:r>
-              <a:rPr lang="de-DE" dirty="0"/>
-              <a:t> </a:t>
-            </a:r>
-            <a:r>
-              <a:rPr lang="de-DE" dirty="0" smtClean="0"/>
-              <a:t>     Richtung fährt wo mehr Platz ist. </a:t>
-            </a:r>
-          </a:p>
-          <a:p>
-            <a:r>
-              <a:rPr lang="de-DE" dirty="0"/>
-              <a:t> </a:t>
-            </a:r>
-            <a:r>
-              <a:rPr lang="de-DE" dirty="0" smtClean="0"/>
-              <a:t>     Lasse den </a:t>
-            </a:r>
-            <a:r>
-              <a:rPr lang="de-DE" dirty="0" err="1" smtClean="0"/>
-              <a:t>mBot</a:t>
-            </a:r>
-            <a:r>
-              <a:rPr lang="de-DE" dirty="0" smtClean="0"/>
-              <a:t> in der Dunkelheit langsamer fahren.</a:t>
+              <a:t> in der Dunkelheit </a:t>
+            </a:r>
+            <a:r>
+              <a:rPr lang="de-DE" dirty="0" smtClean="0"/>
+              <a:t>vorsichtig </a:t>
+            </a:r>
+            <a:r>
+              <a:rPr lang="de-DE" dirty="0" smtClean="0"/>
+              <a:t>fahren.</a:t>
             </a:r>
             <a:endParaRPr lang="de-DE" dirty="0"/>
           </a:p>
@@ -4311,7 +4910,7 @@
           <p:nvPr>
             <p:extLst>
               <p:ext uri="{D42A27DB-BD31-4B8C-83A1-F6EECF244321}">
-                <p14:modId xmlns="" xmlns:p14="http://schemas.microsoft.com/office/powerpoint/2010/main" val="682914404"/>
+                <p14:modId xmlns:p14="http://schemas.microsoft.com/office/powerpoint/2010/main" val="682914404"/>
               </p:ext>
             </p:extLst>
           </p:nvPr>
@@ -4322,9 +4921,59 @@
         </p:xfrm>
         <a:graphic>
           <a:graphicData uri="http://schemas.openxmlformats.org/presentationml/2006/ole">
-            <p:oleObj spid="_x0000_s4222" name="Image" r:id="rId3" imgW="3250794" imgH="2069841" progId="">
-              <p:embed/>
-            </p:oleObj>
+            <mc:AlternateContent xmlns:mc="http://schemas.openxmlformats.org/markup-compatibility/2006">
+              <mc:Choice xmlns:v="urn:schemas-microsoft-com:vml" Requires="v">
+                <p:oleObj spid="_x0000_s4268" name="Image" r:id="rId3" imgW="3250794" imgH="2069841" progId="">
+                  <p:embed/>
+                </p:oleObj>
+              </mc:Choice>
+              <mc:Fallback>
+                <p:oleObj name="Image" r:id="rId3" imgW="3250794" imgH="2069841" progId="">
+                  <p:embed/>
+                  <p:pic>
+                    <p:nvPicPr>
+                      <p:cNvPr id="0" name="Picture 126"/>
+                      <p:cNvPicPr>
+                        <a:picLocks noChangeAspect="1" noChangeArrowheads="1"/>
+                      </p:cNvPicPr>
+                      <p:nvPr/>
+                    </p:nvPicPr>
+                    <p:blipFill>
+                      <a:blip r:embed="rId4">
+                        <a:extLst>
+                          <a:ext uri="{28A0092B-C50C-407E-A947-70E740481C1C}">
+                            <a14:useLocalDpi xmlns:a14="http://schemas.microsoft.com/office/drawing/2010/main" val="0"/>
+                          </a:ext>
+                        </a:extLst>
+                      </a:blip>
+                      <a:srcRect/>
+                      <a:stretch>
+                        <a:fillRect/>
+                      </a:stretch>
+                    </p:blipFill>
+                    <p:spPr bwMode="auto">
+                      <a:xfrm>
+                        <a:off x="95920" y="4106853"/>
+                        <a:ext cx="617488" cy="393166"/>
+                      </a:xfrm>
+                      <a:prstGeom prst="rect">
+                        <a:avLst/>
+                      </a:prstGeom>
+                      <a:noFill/>
+                      <a:extLst>
+                        <a:ext uri="{909E8E84-426E-40DD-AFC4-6F175D3DCCD1}">
+                          <a14:hiddenFill xmlns:a14="http://schemas.microsoft.com/office/drawing/2010/main">
+                            <a:solidFill>
+                              <a:srgbClr val="FFFFFF"/>
+                            </a:solidFill>
+                          </a14:hiddenFill>
+                        </a:ext>
+                      </a:extLst>
+                    </p:spPr>
+                  </p:pic>
+                </p:oleObj>
+              </mc:Fallback>
+            </mc:AlternateContent>
           </a:graphicData>
         </a:graphic>
       </p:graphicFrame>
@@ -4337,7 +4986,7 @@
           <p:nvPr>
             <p:extLst>
               <p:ext uri="{D42A27DB-BD31-4B8C-83A1-F6EECF244321}">
-                <p14:modId xmlns="" xmlns:p14="http://schemas.microsoft.com/office/powerpoint/2010/main" val="3388720268"/>
+                <p14:modId xmlns:p14="http://schemas.microsoft.com/office/powerpoint/2010/main" val="3388720268"/>
               </p:ext>
             </p:extLst>
           </p:nvPr>
@@ -4348,9 +4997,59 @@
         </p:xfrm>
         <a:graphic>
           <a:graphicData uri="http://schemas.openxmlformats.org/presentationml/2006/ole">
-            <p:oleObj spid="_x0000_s4223" name="Image" r:id="rId4" imgW="4012698" imgH="2653968" progId="">
-              <p:embed/>
-            </p:oleObj>
+            <mc:AlternateContent xmlns:mc="http://schemas.openxmlformats.org/markup-compatibility/2006">
+              <mc:Choice xmlns:v="urn:schemas-microsoft-com:vml" Requires="v">
+                <p:oleObj spid="_x0000_s4269" name="Image" r:id="rId5" imgW="4012698" imgH="2653968" progId="">
+                  <p:embed/>
+                </p:oleObj>
+              </mc:Choice>
+              <mc:Fallback>
+                <p:oleObj name="Image" r:id="rId5" imgW="4012698" imgH="2653968" progId="">
+                  <p:embed/>
+                  <p:pic>
+                    <p:nvPicPr>
+                      <p:cNvPr id="0" name="Picture 127"/>
+                      <p:cNvPicPr>
+                        <a:picLocks noChangeAspect="1" noChangeArrowheads="1"/>
+                      </p:cNvPicPr>
+                      <p:nvPr/>
+                    </p:nvPicPr>
+                    <p:blipFill>
+                      <a:blip r:embed="rId6">
+                        <a:extLst>
+                          <a:ext uri="{28A0092B-C50C-407E-A947-70E740481C1C}">
+                            <a14:useLocalDpi xmlns:a14="http://schemas.microsoft.com/office/drawing/2010/main" val="0"/>
+                          </a:ext>
+                        </a:extLst>
+                      </a:blip>
+                      <a:srcRect/>
+                      <a:stretch>
+                        <a:fillRect/>
+                      </a:stretch>
+                    </p:blipFill>
+                    <p:spPr bwMode="auto">
+                      <a:xfrm>
+                        <a:off x="95920" y="8604448"/>
+                        <a:ext cx="700120" cy="463054"/>
+                      </a:xfrm>
+                      <a:prstGeom prst="rect">
+                        <a:avLst/>
+                      </a:prstGeom>
+                      <a:noFill/>
+                      <a:extLst>
+                        <a:ext uri="{909E8E84-426E-40DD-AFC4-6F175D3DCCD1}">
+                          <a14:hiddenFill xmlns:a14="http://schemas.microsoft.com/office/drawing/2010/main">
+                            <a:solidFill>
+                              <a:srgbClr val="FFFFFF"/>
+                            </a:solidFill>
+                          </a14:hiddenFill>
+                        </a:ext>
+                      </a:extLst>
+                    </p:spPr>
+                  </p:pic>
+                </p:oleObj>
+              </mc:Fallback>
+            </mc:AlternateContent>
           </a:graphicData>
         </a:graphic>
       </p:graphicFrame>
@@ -4363,7 +5062,7 @@
           <p:nvPr/>
         </p:nvPicPr>
         <p:blipFill>
-          <a:blip r:embed="rId5" cstate="print"/>
+          <a:blip r:embed="rId7" cstate="print"/>
           <a:stretch>
             <a:fillRect/>
           </a:stretch>
@@ -4387,7 +5086,7 @@
           <p:nvPr/>
         </p:nvPicPr>
         <p:blipFill>
-          <a:blip r:embed="rId6" cstate="print"/>
+          <a:blip r:embed="rId8" cstate="print"/>
           <a:stretch>
             <a:fillRect/>
           </a:stretch>
@@ -4435,6 +5134,102 @@
       <p:pic>
         <p:nvPicPr>
           <p:cNvPr id="25" name="Grafik 24"/>
+          <p:cNvPicPr>
+            <a:picLocks noChangeAspect="1"/>
+          </p:cNvPicPr>
+          <p:nvPr/>
+        </p:nvPicPr>
+        <p:blipFill>
+          <a:blip r:embed="rId9" cstate="print"/>
+          <a:stretch>
+            <a:fillRect/>
+          </a:stretch>
+        </p:blipFill>
+        <p:spPr>
+          <a:xfrm>
+            <a:off x="1858830" y="5371058"/>
+            <a:ext cx="1076325" cy="200025"/>
+          </a:xfrm>
+          <a:prstGeom prst="rect">
+            <a:avLst/>
+          </a:prstGeom>
+        </p:spPr>
+      </p:pic>
+      <p:pic>
+        <p:nvPicPr>
+          <p:cNvPr id="26" name="Grafik 25"/>
+          <p:cNvPicPr>
+            <a:picLocks noChangeAspect="1"/>
+          </p:cNvPicPr>
+          <p:nvPr/>
+        </p:nvPicPr>
+        <p:blipFill>
+          <a:blip r:embed="rId10" cstate="print"/>
+          <a:stretch>
+            <a:fillRect/>
+          </a:stretch>
+        </p:blipFill>
+        <p:spPr>
+          <a:xfrm>
+            <a:off x="1858830" y="5822143"/>
+            <a:ext cx="1076325" cy="209550"/>
+          </a:xfrm>
+          <a:prstGeom prst="rect">
+            <a:avLst/>
+          </a:prstGeom>
+        </p:spPr>
+      </p:pic>
+      <p:pic>
+        <p:nvPicPr>
+          <p:cNvPr id="31" name="Grafik 30"/>
+          <p:cNvPicPr>
+            <a:picLocks noChangeAspect="1"/>
+          </p:cNvPicPr>
+          <p:nvPr/>
+        </p:nvPicPr>
+        <p:blipFill>
+          <a:blip r:embed="rId9" cstate="print"/>
+          <a:stretch>
+            <a:fillRect/>
+          </a:stretch>
+        </p:blipFill>
+        <p:spPr>
+          <a:xfrm>
+            <a:off x="404664" y="840271"/>
+            <a:ext cx="1076325" cy="200025"/>
+          </a:xfrm>
+          <a:prstGeom prst="rect">
+            <a:avLst/>
+          </a:prstGeom>
+        </p:spPr>
+      </p:pic>
+      <p:pic>
+        <p:nvPicPr>
+          <p:cNvPr id="33" name="Grafik 32"/>
+          <p:cNvPicPr>
+            <a:picLocks noChangeAspect="1"/>
+          </p:cNvPicPr>
+          <p:nvPr/>
+        </p:nvPicPr>
+        <p:blipFill>
+          <a:blip r:embed="rId8" cstate="print"/>
+          <a:stretch>
+            <a:fillRect/>
+          </a:stretch>
+        </p:blipFill>
+        <p:spPr>
+          <a:xfrm>
+            <a:off x="1634859" y="814845"/>
+            <a:ext cx="1123950" cy="238125"/>
+          </a:xfrm>
+          <a:prstGeom prst="rect">
+            <a:avLst/>
+          </a:prstGeom>
+        </p:spPr>
+      </p:pic>
+      <p:pic>
+        <p:nvPicPr>
+          <p:cNvPr id="35" name="Grafik 34"/>
           <p:cNvPicPr>
             <a:picLocks noChangeAspect="1"/>
           </p:cNvPicPr>
@@ -4448,103 +5243,7 @@
         </p:blipFill>
         <p:spPr>
           <a:xfrm>
-            <a:off x="1858830" y="5371058"/>
-            <a:ext cx="1076325" cy="200025"/>
-          </a:xfrm>
-          <a:prstGeom prst="rect">
-            <a:avLst/>
-          </a:prstGeom>
-        </p:spPr>
-      </p:pic>
-      <p:pic>
-        <p:nvPicPr>
-          <p:cNvPr id="26" name="Grafik 25"/>
-          <p:cNvPicPr>
-            <a:picLocks noChangeAspect="1"/>
-          </p:cNvPicPr>
-          <p:nvPr/>
-        </p:nvPicPr>
-        <p:blipFill>
-          <a:blip r:embed="rId8" cstate="print"/>
-          <a:stretch>
-            <a:fillRect/>
-          </a:stretch>
-        </p:blipFill>
-        <p:spPr>
-          <a:xfrm>
-            <a:off x="1858830" y="5822143"/>
-            <a:ext cx="1076325" cy="209550"/>
-          </a:xfrm>
-          <a:prstGeom prst="rect">
-            <a:avLst/>
-          </a:prstGeom>
-        </p:spPr>
-      </p:pic>
-      <p:pic>
-        <p:nvPicPr>
-          <p:cNvPr id="31" name="Grafik 30"/>
-          <p:cNvPicPr>
-            <a:picLocks noChangeAspect="1"/>
-          </p:cNvPicPr>
-          <p:nvPr/>
-        </p:nvPicPr>
-        <p:blipFill>
-          <a:blip r:embed="rId7" cstate="print"/>
-          <a:stretch>
-            <a:fillRect/>
-          </a:stretch>
-        </p:blipFill>
-        <p:spPr>
-          <a:xfrm>
-            <a:off x="445980" y="1078140"/>
-            <a:ext cx="1076325" cy="200025"/>
-          </a:xfrm>
-          <a:prstGeom prst="rect">
-            <a:avLst/>
-          </a:prstGeom>
-        </p:spPr>
-      </p:pic>
-      <p:pic>
-        <p:nvPicPr>
-          <p:cNvPr id="33" name="Grafik 32"/>
-          <p:cNvPicPr>
-            <a:picLocks noChangeAspect="1"/>
-          </p:cNvPicPr>
-          <p:nvPr/>
-        </p:nvPicPr>
-        <p:blipFill>
-          <a:blip r:embed="rId6" cstate="print"/>
-          <a:stretch>
-            <a:fillRect/>
-          </a:stretch>
-        </p:blipFill>
-        <p:spPr>
-          <a:xfrm>
-            <a:off x="1744320" y="1059372"/>
-            <a:ext cx="1123950" cy="238125"/>
-          </a:xfrm>
-          <a:prstGeom prst="rect">
-            <a:avLst/>
-          </a:prstGeom>
-        </p:spPr>
-      </p:pic>
-      <p:pic>
-        <p:nvPicPr>
-          <p:cNvPr id="35" name="Grafik 34"/>
-          <p:cNvPicPr>
-            <a:picLocks noChangeAspect="1"/>
-          </p:cNvPicPr>
-          <p:nvPr/>
-        </p:nvPicPr>
-        <p:blipFill>
-          <a:blip r:embed="rId5" cstate="print"/>
-          <a:stretch>
-            <a:fillRect/>
-          </a:stretch>
-        </p:blipFill>
-        <p:spPr>
-          <a:xfrm>
-            <a:off x="4381796" y="1086608"/>
+            <a:off x="1641273" y="1194714"/>
             <a:ext cx="1085850" cy="200025"/>
           </a:xfrm>
           <a:prstGeom prst="rect">
@@ -4561,14 +5260,14 @@
           <p:nvPr/>
         </p:nvPicPr>
         <p:blipFill>
-          <a:blip r:embed="rId9" cstate="print"/>
+          <a:blip r:embed="rId11" cstate="print"/>
           <a:stretch>
             <a:fillRect/>
           </a:stretch>
         </p:blipFill>
         <p:spPr>
           <a:xfrm>
-            <a:off x="2414132" y="1312894"/>
+            <a:off x="2900599" y="1022962"/>
             <a:ext cx="3409950" cy="1752600"/>
           </a:xfrm>
           <a:prstGeom prst="rect">
@@ -4617,30 +5316,6 @@
       <p:pic>
         <p:nvPicPr>
           <p:cNvPr id="37" name="Grafik 36"/>
-          <p:cNvPicPr>
-            <a:picLocks noChangeAspect="1"/>
-          </p:cNvPicPr>
-          <p:nvPr/>
-        </p:nvPicPr>
-        <p:blipFill>
-          <a:blip r:embed="rId8" cstate="print"/>
-          <a:stretch>
-            <a:fillRect/>
-          </a:stretch>
-        </p:blipFill>
-        <p:spPr>
-          <a:xfrm>
-            <a:off x="3025642" y="1073592"/>
-            <a:ext cx="1076325" cy="209550"/>
-          </a:xfrm>
-          <a:prstGeom prst="rect">
-            <a:avLst/>
-          </a:prstGeom>
-        </p:spPr>
-      </p:pic>
-      <p:pic>
-        <p:nvPicPr>
-          <p:cNvPr id="10" name="Grafik 9"/>
           <p:cNvPicPr>
             <a:picLocks noChangeAspect="1"/>
           </p:cNvPicPr>
@@ -4654,8 +5329,8 @@
         </p:blipFill>
         <p:spPr>
           <a:xfrm>
-            <a:off x="3272134" y="5470647"/>
-            <a:ext cx="3305175" cy="1847850"/>
+            <a:off x="391473" y="1194714"/>
+            <a:ext cx="1076325" cy="209550"/>
           </a:xfrm>
           <a:prstGeom prst="rect">
             <a:avLst/>
@@ -4700,10 +5375,390 @@
           </a:p>
         </p:txBody>
       </p:sp>
+      <p:pic>
+        <p:nvPicPr>
+          <p:cNvPr id="5" name="Grafik 4"/>
+          <p:cNvPicPr>
+            <a:picLocks noChangeAspect="1"/>
+          </p:cNvPicPr>
+          <p:nvPr/>
+        </p:nvPicPr>
+        <p:blipFill>
+          <a:blip r:embed="rId12"/>
+          <a:stretch>
+            <a:fillRect/>
+          </a:stretch>
+        </p:blipFill>
+        <p:spPr>
+          <a:xfrm>
+            <a:off x="3062386" y="5385527"/>
+            <a:ext cx="3552825" cy="1981200"/>
+          </a:xfrm>
+          <a:prstGeom prst="rect">
+            <a:avLst/>
+          </a:prstGeom>
+        </p:spPr>
+      </p:pic>
     </p:spTree>
     <p:extLst>
       <p:ext uri="{BB962C8B-B14F-4D97-AF65-F5344CB8AC3E}">
-        <p14:creationId xmlns="" xmlns:p14="http://schemas.microsoft.com/office/powerpoint/2010/main" val="1687280261"/>
+        <p14:creationId xmlns:p14="http://schemas.microsoft.com/office/powerpoint/2010/main" val="1687280261"/>
+      </p:ext>
+    </p:extLst>
+  </p:cSld>
+  <p:clrMapOvr>
+    <a:masterClrMapping/>
+  </p:clrMapOvr>
+  <p:timing>
+    <p:tnLst>
+      <p:par>
+        <p:cTn id="1" dur="indefinite" restart="never" nodeType="tmRoot"/>
+      </p:par>
+    </p:tnLst>
+  </p:timing>
+</p:sld>
+</file>
+
+<file path=ppt/slides/slide7.xml><?xml version="1.0" encoding="utf-8"?>
+<p:sld xmlns:a="http://schemas.openxmlformats.org/drawingml/2006/main" xmlns:r="http://schemas.openxmlformats.org/officeDocument/2006/relationships" xmlns:p="http://schemas.openxmlformats.org/presentationml/2006/main">
+  <p:cSld>
+    <p:spTree>
+      <p:nvGrpSpPr>
+        <p:cNvPr id="1" name=""/>
+        <p:cNvGrpSpPr/>
+        <p:nvPr/>
+      </p:nvGrpSpPr>
+      <p:grpSpPr>
+        <a:xfrm>
+          <a:off x="0" y="0"/>
+          <a:ext cx="0" cy="0"/>
+          <a:chOff x="0" y="0"/>
+          <a:chExt cx="0" cy="0"/>
+        </a:xfrm>
+      </p:grpSpPr>
+      <p:sp>
+        <p:nvSpPr>
+          <p:cNvPr id="7" name="Textplatzhalter 6"/>
+          <p:cNvSpPr>
+            <a:spLocks noGrp="1"/>
+          </p:cNvSpPr>
+          <p:nvPr>
+            <p:ph type="body" sz="quarter" idx="23"/>
+          </p:nvPr>
+        </p:nvSpPr>
+        <p:spPr>
+          <a:xfrm>
+            <a:off x="1196752" y="107504"/>
+            <a:ext cx="4591530" cy="765175"/>
+          </a:xfrm>
+        </p:spPr>
+        <p:txBody>
+          <a:bodyPr/>
+          <a:lstStyle/>
+          <a:p>
+            <a:r>
+              <a:rPr lang="de-DE" dirty="0" smtClean="0"/>
+              <a:t>Mentoren Cheat-Sheet</a:t>
+            </a:r>
+            <a:endParaRPr lang="de-DE" dirty="0"/>
+          </a:p>
+        </p:txBody>
+      </p:sp>
+      <p:pic>
+        <p:nvPicPr>
+          <p:cNvPr id="10" name="Grafik 9"/>
+          <p:cNvPicPr>
+            <a:picLocks noChangeAspect="1"/>
+          </p:cNvPicPr>
+          <p:nvPr/>
+        </p:nvPicPr>
+        <p:blipFill>
+          <a:blip r:embed="rId2"/>
+          <a:stretch>
+            <a:fillRect/>
+          </a:stretch>
+        </p:blipFill>
+        <p:spPr>
+          <a:xfrm>
+            <a:off x="3861048" y="5004048"/>
+            <a:ext cx="2880320" cy="3678581"/>
+          </a:xfrm>
+          <a:prstGeom prst="rect">
+            <a:avLst/>
+          </a:prstGeom>
+        </p:spPr>
+      </p:pic>
+      <p:sp>
+        <p:nvSpPr>
+          <p:cNvPr id="11" name="TextBox 24"/>
+          <p:cNvSpPr txBox="1"/>
+          <p:nvPr/>
+        </p:nvSpPr>
+        <p:spPr>
+          <a:xfrm>
+            <a:off x="476672" y="704703"/>
+            <a:ext cx="6192688" cy="3416320"/>
+          </a:xfrm>
+          <a:prstGeom prst="rect">
+            <a:avLst/>
+          </a:prstGeom>
+          <a:noFill/>
+        </p:spPr>
+        <p:txBody>
+          <a:bodyPr wrap="square" rtlCol="0">
+            <a:spAutoFit/>
+          </a:bodyPr>
+          <a:lstStyle/>
+          <a:p>
+            <a:r>
+              <a:rPr lang="de-DE" dirty="0" smtClean="0"/>
+              <a:t>1. Beschreibe den Kids den Aufbau des Programms (Folie 2a)</a:t>
+            </a:r>
+          </a:p>
+          <a:p>
+            <a:r>
+              <a:rPr lang="de-DE" dirty="0" smtClean="0"/>
+              <a:t>2. Zeige den </a:t>
+            </a:r>
+            <a:r>
+              <a:rPr lang="de-DE" dirty="0" err="1" smtClean="0"/>
+              <a:t>mBot</a:t>
+            </a:r>
+            <a:r>
+              <a:rPr lang="de-DE" dirty="0" smtClean="0"/>
+              <a:t> und erkläre die Sensoren und Aktoren</a:t>
+            </a:r>
+            <a:endParaRPr lang="de-DE" dirty="0" smtClean="0"/>
+          </a:p>
+          <a:p>
+            <a:r>
+              <a:rPr lang="de-DE" dirty="0" smtClean="0"/>
+              <a:t>3. Erkläre den groben Ablauf: </a:t>
+            </a:r>
+            <a:endParaRPr lang="de-DE" dirty="0"/>
+          </a:p>
+          <a:p>
+            <a:r>
+              <a:rPr lang="de-DE" dirty="0" smtClean="0"/>
+              <a:t>BEIDE suchen sich eine Figur aus programmieren nacheinander bis 3b, danach immer abwechselnd.</a:t>
+            </a:r>
+          </a:p>
+          <a:p>
+            <a:r>
+              <a:rPr lang="de-DE" dirty="0" smtClean="0"/>
+              <a:t>4. Ob die Bühne geleert wird oder nicht, sollen sie entscheiden.</a:t>
+            </a:r>
+          </a:p>
+          <a:p>
+            <a:r>
+              <a:rPr lang="de-DE" dirty="0" smtClean="0">
+                <a:solidFill>
+                  <a:srgbClr val="FF0000"/>
+                </a:solidFill>
+              </a:rPr>
+              <a:t>Achtung: Tasten nicht doppelt belegen.</a:t>
+            </a:r>
+          </a:p>
+          <a:p>
+            <a:r>
+              <a:rPr lang="de-DE" dirty="0" smtClean="0"/>
+              <a:t>5. Nachdem der Not-Aus eingeführt wurde -&gt; immer drücken nach jeden Versuch.</a:t>
+            </a:r>
+          </a:p>
+          <a:p>
+            <a:r>
+              <a:rPr lang="de-DE" dirty="0">
+                <a:solidFill>
+                  <a:srgbClr val="FF0000"/>
+                </a:solidFill>
+              </a:rPr>
+              <a:t>Achtung: </a:t>
+            </a:r>
+            <a:r>
+              <a:rPr lang="de-DE" dirty="0" smtClean="0">
+                <a:solidFill>
+                  <a:srgbClr val="FF0000"/>
+                </a:solidFill>
+              </a:rPr>
+              <a:t>Schleifen vor Änderung stoppen! </a:t>
+            </a:r>
+          </a:p>
+          <a:p>
+            <a:endParaRPr lang="de-DE" dirty="0">
+              <a:solidFill>
+                <a:srgbClr val="FF0000"/>
+              </a:solidFill>
+            </a:endParaRPr>
+          </a:p>
+          <a:p>
+            <a:r>
+              <a:rPr lang="de-DE" dirty="0" smtClean="0">
+                <a:solidFill>
+                  <a:srgbClr val="FF0000"/>
+                </a:solidFill>
+              </a:rPr>
+              <a:t>Oft speichern! Am besten direkt zu Beginn!</a:t>
+            </a:r>
+            <a:endParaRPr lang="de-DE" dirty="0">
+              <a:solidFill>
+                <a:srgbClr val="FF0000"/>
+              </a:solidFill>
+            </a:endParaRPr>
+          </a:p>
+        </p:txBody>
+      </p:sp>
+      <p:sp>
+        <p:nvSpPr>
+          <p:cNvPr id="12" name="TextBox 24"/>
+          <p:cNvSpPr txBox="1"/>
+          <p:nvPr/>
+        </p:nvSpPr>
+        <p:spPr>
+          <a:xfrm>
+            <a:off x="188392" y="5292080"/>
+            <a:ext cx="3384376" cy="2031325"/>
+          </a:xfrm>
+          <a:prstGeom prst="rect">
+            <a:avLst/>
+          </a:prstGeom>
+          <a:noFill/>
+        </p:spPr>
+        <p:txBody>
+          <a:bodyPr wrap="square" rtlCol="0">
+            <a:spAutoFit/>
+          </a:bodyPr>
+          <a:lstStyle/>
+          <a:p>
+            <a:r>
+              <a:rPr lang="de-DE" b="1" dirty="0" smtClean="0"/>
+              <a:t>RGB</a:t>
+            </a:r>
+          </a:p>
+          <a:p>
+            <a:r>
+              <a:rPr lang="de-DE" dirty="0" smtClean="0">
+                <a:solidFill>
+                  <a:srgbClr val="FF0000"/>
+                </a:solidFill>
+              </a:rPr>
+              <a:t>Rot</a:t>
+            </a:r>
+            <a:r>
+              <a:rPr lang="de-DE" dirty="0" smtClean="0"/>
+              <a:t> – </a:t>
+            </a:r>
+            <a:r>
+              <a:rPr lang="de-DE" dirty="0" smtClean="0">
+                <a:solidFill>
+                  <a:srgbClr val="00B050"/>
+                </a:solidFill>
+              </a:rPr>
+              <a:t>Grün</a:t>
+            </a:r>
+            <a:r>
+              <a:rPr lang="de-DE" dirty="0" smtClean="0"/>
+              <a:t> – </a:t>
+            </a:r>
+            <a:r>
+              <a:rPr lang="de-DE" dirty="0" smtClean="0">
+                <a:solidFill>
+                  <a:srgbClr val="0070C0"/>
+                </a:solidFill>
+              </a:rPr>
+              <a:t>Blau</a:t>
+            </a:r>
+            <a:r>
+              <a:rPr lang="de-DE" dirty="0" smtClean="0"/>
+              <a:t> </a:t>
+            </a:r>
+          </a:p>
+          <a:p>
+            <a:r>
+              <a:rPr lang="de-DE" dirty="0" smtClean="0"/>
+              <a:t>Alle Farben sind damit möglich. Wie beim Fernseher, wenn man sehr dicht heran geht.</a:t>
+            </a:r>
+          </a:p>
+          <a:p>
+            <a:endParaRPr lang="de-DE" dirty="0"/>
+          </a:p>
+          <a:p>
+            <a:r>
+              <a:rPr lang="de-DE" b="1" dirty="0" smtClean="0"/>
+              <a:t>Skala 0 - 255</a:t>
+            </a:r>
+            <a:endParaRPr lang="de-DE" b="1" dirty="0"/>
+          </a:p>
+        </p:txBody>
+      </p:sp>
+      <p:pic>
+        <p:nvPicPr>
+          <p:cNvPr id="14" name="Picture 2" descr="https://bpiinc.files.wordpress.com/2011/11/rgb.png"/>
+          <p:cNvPicPr>
+            <a:picLocks noChangeAspect="1" noChangeArrowheads="1"/>
+          </p:cNvPicPr>
+          <p:nvPr/>
+        </p:nvPicPr>
+        <p:blipFill>
+          <a:blip r:embed="rId3" cstate="print">
+            <a:extLst>
+              <a:ext uri="{28A0092B-C50C-407E-A947-70E740481C1C}">
+                <a14:useLocalDpi xmlns:a14="http://schemas.microsoft.com/office/drawing/2010/main" val="0"/>
+              </a:ext>
+            </a:extLst>
+          </a:blip>
+          <a:srcRect/>
+          <a:stretch>
+            <a:fillRect/>
+          </a:stretch>
+        </p:blipFill>
+        <p:spPr bwMode="auto">
+          <a:xfrm>
+            <a:off x="2266099" y="4608003"/>
+            <a:ext cx="1224136" cy="1224137"/>
+          </a:xfrm>
+          <a:prstGeom prst="rect">
+            <a:avLst/>
+          </a:prstGeom>
+          <a:noFill/>
+          <a:extLst>
+            <a:ext uri="{909E8E84-426E-40DD-AFC4-6F175D3DCCD1}">
+              <a14:hiddenFill xmlns:a14="http://schemas.microsoft.com/office/drawing/2010/main">
+                <a:solidFill>
+                  <a:srgbClr val="FFFFFF"/>
+                </a:solidFill>
+              </a14:hiddenFill>
+            </a:ext>
+          </a:extLst>
+        </p:spPr>
+      </p:pic>
+      <p:pic>
+        <p:nvPicPr>
+          <p:cNvPr id="13" name="Grafik 12"/>
+          <p:cNvPicPr>
+            <a:picLocks noChangeAspect="1"/>
+          </p:cNvPicPr>
+          <p:nvPr/>
+        </p:nvPicPr>
+        <p:blipFill>
+          <a:blip r:embed="rId4"/>
+          <a:stretch>
+            <a:fillRect/>
+          </a:stretch>
+        </p:blipFill>
+        <p:spPr>
+          <a:xfrm>
+            <a:off x="93188" y="7361601"/>
+            <a:ext cx="3767860" cy="1132993"/>
+          </a:xfrm>
+          <a:prstGeom prst="rect">
+            <a:avLst/>
+          </a:prstGeom>
+        </p:spPr>
+      </p:pic>
+    </p:spTree>
+    <p:extLst>
+      <p:ext uri="{BB962C8B-B14F-4D97-AF65-F5344CB8AC3E}">
+        <p14:creationId xmlns:p14="http://schemas.microsoft.com/office/powerpoint/2010/main" val="4261970778"/>
       </p:ext>
     </p:extLst>
   </p:cSld>

</xml_diff>